<commit_message>
added optional slide_layout * updated template
</commit_message>
<xml_diff>
--- a/simple-template-markup.pptx
+++ b/simple-template-markup.pptx
@@ -276,7 +276,7 @@
       </p15:sldGuideLst>
     </p:ext>
     <p:ext uri="http://customooxmlschemas.google.com/">
-      <go:slidesCustomData xmlns:go="http://customooxmlschemas.google.com/" r:id="rId11" roundtripDataSignature="AMtx7mgr3wOdc9VgBNyyHUk1uxCh4IQlAA=="/>
+      <go:slidesCustomData xmlns:go="http://customooxmlschemas.google.com/" r:id="rId11" roundtripDataSignature="AMtx7mhEb2uA3T/RN+IJo/ehe6Vw7itfPQ=="/>
     </p:ext>
   </p:extLst>
 </p:presentation>
@@ -713,7 +713,7 @@
   <p:cSld>
     <p:spTree>
       <p:nvGrpSpPr>
-        <p:cNvPr id="80" name="Shape 80"/>
+        <p:cNvPr id="86" name="Shape 86"/>
         <p:cNvGrpSpPr/>
         <p:nvPr/>
       </p:nvGrpSpPr>
@@ -727,7 +727,7 @@
       </p:grpSpPr>
       <p:sp>
         <p:nvSpPr>
-          <p:cNvPr id="81" name="Google Shape;81;p1:notes"/>
+          <p:cNvPr id="87" name="Google Shape;87;p1:notes"/>
           <p:cNvSpPr txBox="1"/>
           <p:nvPr>
             <p:ph idx="1" type="body"/>
@@ -766,7 +766,7 @@
       </p:sp>
       <p:sp>
         <p:nvSpPr>
-          <p:cNvPr id="82" name="Google Shape;82;p1:notes"/>
+          <p:cNvPr id="88" name="Google Shape;88;p1:notes"/>
           <p:cNvSpPr/>
           <p:nvPr>
             <p:ph idx="2" type="sldImg"/>
@@ -1718,11 +1718,11 @@
 </file>
 
 <file path=ppt/slideLayouts/slideLayout10.xml><?xml version="1.0" encoding="utf-8"?>
-<p:sldLayout xmlns:a="http://schemas.openxmlformats.org/drawingml/2006/main" xmlns:r="http://schemas.openxmlformats.org/officeDocument/2006/relationships" xmlns:mc="http://schemas.openxmlformats.org/markup-compatibility/2006" xmlns:mv="urn:schemas-microsoft-com:mac:vml" xmlns:p="http://schemas.openxmlformats.org/presentationml/2006/main" xmlns:c="http://schemas.openxmlformats.org/drawingml/2006/chart" xmlns:dgm="http://schemas.openxmlformats.org/drawingml/2006/diagram" xmlns:o="urn:schemas-microsoft-com:office:office" xmlns:v="urn:schemas-microsoft-com:vml" xmlns:pvml="urn:schemas-microsoft-com:office:powerpoint" xmlns:com="http://schemas.openxmlformats.org/drawingml/2006/compatibility" xmlns:p14="http://schemas.microsoft.com/office/powerpoint/2010/main" xmlns:p15="http://schemas.microsoft.com/office/powerpoint/2012/main" matchingName="İki İçerik" type="twoObj">
-  <p:cSld name="TWO_OBJECTS">
+<p:sldLayout xmlns:a="http://schemas.openxmlformats.org/drawingml/2006/main" xmlns:r="http://schemas.openxmlformats.org/officeDocument/2006/relationships" xmlns:mc="http://schemas.openxmlformats.org/markup-compatibility/2006" xmlns:mv="urn:schemas-microsoft-com:mac:vml" xmlns:p="http://schemas.openxmlformats.org/presentationml/2006/main" xmlns:c="http://schemas.openxmlformats.org/drawingml/2006/chart" xmlns:dgm="http://schemas.openxmlformats.org/drawingml/2006/diagram" xmlns:o="urn:schemas-microsoft-com:office:office" xmlns:v="urn:schemas-microsoft-com:vml" xmlns:pvml="urn:schemas-microsoft-com:office:powerpoint" xmlns:com="http://schemas.openxmlformats.org/drawingml/2006/compatibility" xmlns:p14="http://schemas.microsoft.com/office/powerpoint/2010/main" xmlns:p15="http://schemas.microsoft.com/office/powerpoint/2012/main" matchingName="Karşılaştırma" type="twoTxTwoObj">
+  <p:cSld name="TWO_OBJECTS_WITH_TEXT">
     <p:spTree>
       <p:nvGrpSpPr>
-        <p:cNvPr id="67" name="Shape 67"/>
+        <p:cNvPr id="64" name="Shape 64"/>
         <p:cNvGrpSpPr/>
         <p:nvPr/>
       </p:nvGrpSpPr>
@@ -1736,7 +1736,7 @@
       </p:grpSpPr>
       <p:sp>
         <p:nvSpPr>
-          <p:cNvPr id="68" name="Google Shape;68;p14"/>
+          <p:cNvPr id="65" name="Google Shape;65;p13"/>
           <p:cNvSpPr txBox="1"/>
           <p:nvPr>
             <p:ph type="title"/>
@@ -1865,7 +1865,1412 @@
       </p:sp>
       <p:sp>
         <p:nvSpPr>
-          <p:cNvPr id="69" name="Google Shape;69;p14"/>
+          <p:cNvPr id="66" name="Google Shape;66;p13"/>
+          <p:cNvSpPr txBox="1"/>
+          <p:nvPr>
+            <p:ph idx="1" type="body"/>
+          </p:nvPr>
+        </p:nvSpPr>
+        <p:spPr>
+          <a:xfrm>
+            <a:off x="457200" y="1535113"/>
+            <a:ext cx="4040100" cy="639900"/>
+          </a:xfrm>
+          <a:prstGeom prst="rect">
+            <a:avLst/>
+          </a:prstGeom>
+          <a:noFill/>
+          <a:ln>
+            <a:noFill/>
+          </a:ln>
+        </p:spPr>
+        <p:txBody>
+          <a:bodyPr anchorCtr="0" anchor="b" bIns="45700" lIns="91425" spcFirstLastPara="1" rIns="91425" wrap="square" tIns="45700">
+            <a:noAutofit/>
+          </a:bodyPr>
+          <a:lstStyle>
+            <a:lvl1pPr indent="-228600" lvl="0" marL="457200" rtl="0" algn="l">
+              <a:spcBef>
+                <a:spcPts val="480"/>
+              </a:spcBef>
+              <a:spcAft>
+                <a:spcPts val="0"/>
+              </a:spcAft>
+              <a:buClr>
+                <a:schemeClr val="dk1"/>
+              </a:buClr>
+              <a:buSzPts val="2400"/>
+              <a:buFont typeface="Arial"/>
+              <a:buNone/>
+              <a:defRPr b="1" sz="2400"/>
+            </a:lvl1pPr>
+            <a:lvl2pPr indent="-228600" lvl="1" marL="914400" rtl="0" algn="l">
+              <a:spcBef>
+                <a:spcPts val="400"/>
+              </a:spcBef>
+              <a:spcAft>
+                <a:spcPts val="0"/>
+              </a:spcAft>
+              <a:buClr>
+                <a:schemeClr val="dk1"/>
+              </a:buClr>
+              <a:buSzPts val="2000"/>
+              <a:buFont typeface="Arial"/>
+              <a:buNone/>
+              <a:defRPr b="1" sz="2000"/>
+            </a:lvl2pPr>
+            <a:lvl3pPr indent="-228600" lvl="2" marL="1371600" rtl="0" algn="l">
+              <a:spcBef>
+                <a:spcPts val="360"/>
+              </a:spcBef>
+              <a:spcAft>
+                <a:spcPts val="0"/>
+              </a:spcAft>
+              <a:buClr>
+                <a:schemeClr val="dk1"/>
+              </a:buClr>
+              <a:buSzPts val="1800"/>
+              <a:buFont typeface="Arial"/>
+              <a:buNone/>
+              <a:defRPr b="1" sz="1800"/>
+            </a:lvl3pPr>
+            <a:lvl4pPr indent="-228600" lvl="3" marL="1828800" rtl="0" algn="l">
+              <a:spcBef>
+                <a:spcPts val="320"/>
+              </a:spcBef>
+              <a:spcAft>
+                <a:spcPts val="0"/>
+              </a:spcAft>
+              <a:buClr>
+                <a:schemeClr val="dk1"/>
+              </a:buClr>
+              <a:buSzPts val="1600"/>
+              <a:buFont typeface="Arial"/>
+              <a:buNone/>
+              <a:defRPr b="1" sz="1600"/>
+            </a:lvl4pPr>
+            <a:lvl5pPr indent="-228600" lvl="4" marL="2286000" rtl="0" algn="l">
+              <a:spcBef>
+                <a:spcPts val="320"/>
+              </a:spcBef>
+              <a:spcAft>
+                <a:spcPts val="0"/>
+              </a:spcAft>
+              <a:buClr>
+                <a:schemeClr val="dk1"/>
+              </a:buClr>
+              <a:buSzPts val="1600"/>
+              <a:buFont typeface="Arial"/>
+              <a:buNone/>
+              <a:defRPr b="1" sz="1600"/>
+            </a:lvl5pPr>
+            <a:lvl6pPr indent="-228600" lvl="5" marL="2743200" rtl="0" algn="l">
+              <a:spcBef>
+                <a:spcPts val="320"/>
+              </a:spcBef>
+              <a:spcAft>
+                <a:spcPts val="0"/>
+              </a:spcAft>
+              <a:buClr>
+                <a:schemeClr val="dk1"/>
+              </a:buClr>
+              <a:buSzPts val="1600"/>
+              <a:buFont typeface="Arial"/>
+              <a:buNone/>
+              <a:defRPr b="1" sz="1600"/>
+            </a:lvl6pPr>
+            <a:lvl7pPr indent="-228600" lvl="6" marL="3200400" rtl="0" algn="l">
+              <a:spcBef>
+                <a:spcPts val="320"/>
+              </a:spcBef>
+              <a:spcAft>
+                <a:spcPts val="0"/>
+              </a:spcAft>
+              <a:buClr>
+                <a:schemeClr val="dk1"/>
+              </a:buClr>
+              <a:buSzPts val="1600"/>
+              <a:buFont typeface="Arial"/>
+              <a:buNone/>
+              <a:defRPr b="1" sz="1600"/>
+            </a:lvl7pPr>
+            <a:lvl8pPr indent="-228600" lvl="7" marL="3657600" rtl="0" algn="l">
+              <a:spcBef>
+                <a:spcPts val="320"/>
+              </a:spcBef>
+              <a:spcAft>
+                <a:spcPts val="0"/>
+              </a:spcAft>
+              <a:buClr>
+                <a:schemeClr val="dk1"/>
+              </a:buClr>
+              <a:buSzPts val="1600"/>
+              <a:buFont typeface="Arial"/>
+              <a:buNone/>
+              <a:defRPr b="1" sz="1600"/>
+            </a:lvl8pPr>
+            <a:lvl9pPr indent="-228600" lvl="8" marL="4114800" rtl="0" algn="l">
+              <a:spcBef>
+                <a:spcPts val="320"/>
+              </a:spcBef>
+              <a:spcAft>
+                <a:spcPts val="0"/>
+              </a:spcAft>
+              <a:buClr>
+                <a:schemeClr val="dk1"/>
+              </a:buClr>
+              <a:buSzPts val="1600"/>
+              <a:buFont typeface="Arial"/>
+              <a:buNone/>
+              <a:defRPr b="1" sz="1600"/>
+            </a:lvl9pPr>
+          </a:lstStyle>
+          <a:p/>
+        </p:txBody>
+      </p:sp>
+      <p:sp>
+        <p:nvSpPr>
+          <p:cNvPr id="67" name="Google Shape;67;p13"/>
+          <p:cNvSpPr txBox="1"/>
+          <p:nvPr>
+            <p:ph idx="2" type="body"/>
+          </p:nvPr>
+        </p:nvSpPr>
+        <p:spPr>
+          <a:xfrm>
+            <a:off x="457200" y="2174875"/>
+            <a:ext cx="4040100" cy="3951300"/>
+          </a:xfrm>
+          <a:prstGeom prst="rect">
+            <a:avLst/>
+          </a:prstGeom>
+          <a:noFill/>
+          <a:ln>
+            <a:noFill/>
+          </a:ln>
+        </p:spPr>
+        <p:txBody>
+          <a:bodyPr anchorCtr="0" anchor="t" bIns="45700" lIns="91425" spcFirstLastPara="1" rIns="91425" wrap="square" tIns="45700">
+            <a:noAutofit/>
+          </a:bodyPr>
+          <a:lstStyle>
+            <a:lvl1pPr indent="-381000" lvl="0" marL="457200" rtl="0" algn="l">
+              <a:spcBef>
+                <a:spcPts val="480"/>
+              </a:spcBef>
+              <a:spcAft>
+                <a:spcPts val="0"/>
+              </a:spcAft>
+              <a:buClr>
+                <a:schemeClr val="dk1"/>
+              </a:buClr>
+              <a:buSzPts val="2400"/>
+              <a:buFont typeface="Arial"/>
+              <a:buChar char="•"/>
+              <a:defRPr sz="2400"/>
+            </a:lvl1pPr>
+            <a:lvl2pPr indent="-355600" lvl="1" marL="914400" rtl="0" algn="l">
+              <a:spcBef>
+                <a:spcPts val="400"/>
+              </a:spcBef>
+              <a:spcAft>
+                <a:spcPts val="0"/>
+              </a:spcAft>
+              <a:buClr>
+                <a:schemeClr val="dk1"/>
+              </a:buClr>
+              <a:buSzPts val="2000"/>
+              <a:buFont typeface="Arial"/>
+              <a:buChar char="–"/>
+              <a:defRPr sz="2000"/>
+            </a:lvl2pPr>
+            <a:lvl3pPr indent="-342900" lvl="2" marL="1371600" rtl="0" algn="l">
+              <a:spcBef>
+                <a:spcPts val="360"/>
+              </a:spcBef>
+              <a:spcAft>
+                <a:spcPts val="0"/>
+              </a:spcAft>
+              <a:buClr>
+                <a:schemeClr val="dk1"/>
+              </a:buClr>
+              <a:buSzPts val="1800"/>
+              <a:buFont typeface="Arial"/>
+              <a:buChar char="•"/>
+              <a:defRPr sz="1800"/>
+            </a:lvl3pPr>
+            <a:lvl4pPr indent="-330200" lvl="3" marL="1828800" rtl="0" algn="l">
+              <a:spcBef>
+                <a:spcPts val="320"/>
+              </a:spcBef>
+              <a:spcAft>
+                <a:spcPts val="0"/>
+              </a:spcAft>
+              <a:buClr>
+                <a:schemeClr val="dk1"/>
+              </a:buClr>
+              <a:buSzPts val="1600"/>
+              <a:buFont typeface="Arial"/>
+              <a:buChar char="–"/>
+              <a:defRPr sz="1600"/>
+            </a:lvl4pPr>
+            <a:lvl5pPr indent="-330200" lvl="4" marL="2286000" rtl="0" algn="l">
+              <a:spcBef>
+                <a:spcPts val="320"/>
+              </a:spcBef>
+              <a:spcAft>
+                <a:spcPts val="0"/>
+              </a:spcAft>
+              <a:buClr>
+                <a:schemeClr val="dk1"/>
+              </a:buClr>
+              <a:buSzPts val="1600"/>
+              <a:buFont typeface="Arial"/>
+              <a:buChar char="»"/>
+              <a:defRPr sz="1600"/>
+            </a:lvl5pPr>
+            <a:lvl6pPr indent="-330200" lvl="5" marL="2743200" rtl="0" algn="l">
+              <a:spcBef>
+                <a:spcPts val="320"/>
+              </a:spcBef>
+              <a:spcAft>
+                <a:spcPts val="0"/>
+              </a:spcAft>
+              <a:buClr>
+                <a:schemeClr val="dk1"/>
+              </a:buClr>
+              <a:buSzPts val="1600"/>
+              <a:buFont typeface="Arial"/>
+              <a:buChar char="»"/>
+              <a:defRPr sz="1600"/>
+            </a:lvl6pPr>
+            <a:lvl7pPr indent="-330200" lvl="6" marL="3200400" rtl="0" algn="l">
+              <a:spcBef>
+                <a:spcPts val="320"/>
+              </a:spcBef>
+              <a:spcAft>
+                <a:spcPts val="0"/>
+              </a:spcAft>
+              <a:buClr>
+                <a:schemeClr val="dk1"/>
+              </a:buClr>
+              <a:buSzPts val="1600"/>
+              <a:buFont typeface="Arial"/>
+              <a:buChar char="»"/>
+              <a:defRPr sz="1600"/>
+            </a:lvl7pPr>
+            <a:lvl8pPr indent="-330200" lvl="7" marL="3657600" rtl="0" algn="l">
+              <a:spcBef>
+                <a:spcPts val="320"/>
+              </a:spcBef>
+              <a:spcAft>
+                <a:spcPts val="0"/>
+              </a:spcAft>
+              <a:buClr>
+                <a:schemeClr val="dk1"/>
+              </a:buClr>
+              <a:buSzPts val="1600"/>
+              <a:buFont typeface="Arial"/>
+              <a:buChar char="»"/>
+              <a:defRPr sz="1600"/>
+            </a:lvl8pPr>
+            <a:lvl9pPr indent="-330200" lvl="8" marL="4114800" rtl="0" algn="l">
+              <a:spcBef>
+                <a:spcPts val="320"/>
+              </a:spcBef>
+              <a:spcAft>
+                <a:spcPts val="0"/>
+              </a:spcAft>
+              <a:buClr>
+                <a:schemeClr val="dk1"/>
+              </a:buClr>
+              <a:buSzPts val="1600"/>
+              <a:buFont typeface="Arial"/>
+              <a:buChar char="»"/>
+              <a:defRPr sz="1600"/>
+            </a:lvl9pPr>
+          </a:lstStyle>
+          <a:p/>
+        </p:txBody>
+      </p:sp>
+      <p:sp>
+        <p:nvSpPr>
+          <p:cNvPr id="68" name="Google Shape;68;p13"/>
+          <p:cNvSpPr txBox="1"/>
+          <p:nvPr>
+            <p:ph idx="3" type="body"/>
+          </p:nvPr>
+        </p:nvSpPr>
+        <p:spPr>
+          <a:xfrm>
+            <a:off x="4645025" y="1535113"/>
+            <a:ext cx="4041900" cy="639900"/>
+          </a:xfrm>
+          <a:prstGeom prst="rect">
+            <a:avLst/>
+          </a:prstGeom>
+          <a:noFill/>
+          <a:ln>
+            <a:noFill/>
+          </a:ln>
+        </p:spPr>
+        <p:txBody>
+          <a:bodyPr anchorCtr="0" anchor="b" bIns="45700" lIns="91425" spcFirstLastPara="1" rIns="91425" wrap="square" tIns="45700">
+            <a:noAutofit/>
+          </a:bodyPr>
+          <a:lstStyle>
+            <a:lvl1pPr indent="-228600" lvl="0" marL="457200" rtl="0" algn="l">
+              <a:spcBef>
+                <a:spcPts val="480"/>
+              </a:spcBef>
+              <a:spcAft>
+                <a:spcPts val="0"/>
+              </a:spcAft>
+              <a:buClr>
+                <a:schemeClr val="dk1"/>
+              </a:buClr>
+              <a:buSzPts val="2400"/>
+              <a:buFont typeface="Arial"/>
+              <a:buNone/>
+              <a:defRPr b="1" sz="2400"/>
+            </a:lvl1pPr>
+            <a:lvl2pPr indent="-228600" lvl="1" marL="914400" rtl="0" algn="l">
+              <a:spcBef>
+                <a:spcPts val="400"/>
+              </a:spcBef>
+              <a:spcAft>
+                <a:spcPts val="0"/>
+              </a:spcAft>
+              <a:buClr>
+                <a:schemeClr val="dk1"/>
+              </a:buClr>
+              <a:buSzPts val="2000"/>
+              <a:buFont typeface="Arial"/>
+              <a:buNone/>
+              <a:defRPr b="1" sz="2000"/>
+            </a:lvl2pPr>
+            <a:lvl3pPr indent="-228600" lvl="2" marL="1371600" rtl="0" algn="l">
+              <a:spcBef>
+                <a:spcPts val="360"/>
+              </a:spcBef>
+              <a:spcAft>
+                <a:spcPts val="0"/>
+              </a:spcAft>
+              <a:buClr>
+                <a:schemeClr val="dk1"/>
+              </a:buClr>
+              <a:buSzPts val="1800"/>
+              <a:buFont typeface="Arial"/>
+              <a:buNone/>
+              <a:defRPr b="1" sz="1800"/>
+            </a:lvl3pPr>
+            <a:lvl4pPr indent="-228600" lvl="3" marL="1828800" rtl="0" algn="l">
+              <a:spcBef>
+                <a:spcPts val="320"/>
+              </a:spcBef>
+              <a:spcAft>
+                <a:spcPts val="0"/>
+              </a:spcAft>
+              <a:buClr>
+                <a:schemeClr val="dk1"/>
+              </a:buClr>
+              <a:buSzPts val="1600"/>
+              <a:buFont typeface="Arial"/>
+              <a:buNone/>
+              <a:defRPr b="1" sz="1600"/>
+            </a:lvl4pPr>
+            <a:lvl5pPr indent="-228600" lvl="4" marL="2286000" rtl="0" algn="l">
+              <a:spcBef>
+                <a:spcPts val="320"/>
+              </a:spcBef>
+              <a:spcAft>
+                <a:spcPts val="0"/>
+              </a:spcAft>
+              <a:buClr>
+                <a:schemeClr val="dk1"/>
+              </a:buClr>
+              <a:buSzPts val="1600"/>
+              <a:buFont typeface="Arial"/>
+              <a:buNone/>
+              <a:defRPr b="1" sz="1600"/>
+            </a:lvl5pPr>
+            <a:lvl6pPr indent="-228600" lvl="5" marL="2743200" rtl="0" algn="l">
+              <a:spcBef>
+                <a:spcPts val="320"/>
+              </a:spcBef>
+              <a:spcAft>
+                <a:spcPts val="0"/>
+              </a:spcAft>
+              <a:buClr>
+                <a:schemeClr val="dk1"/>
+              </a:buClr>
+              <a:buSzPts val="1600"/>
+              <a:buFont typeface="Arial"/>
+              <a:buNone/>
+              <a:defRPr b="1" sz="1600"/>
+            </a:lvl6pPr>
+            <a:lvl7pPr indent="-228600" lvl="6" marL="3200400" rtl="0" algn="l">
+              <a:spcBef>
+                <a:spcPts val="320"/>
+              </a:spcBef>
+              <a:spcAft>
+                <a:spcPts val="0"/>
+              </a:spcAft>
+              <a:buClr>
+                <a:schemeClr val="dk1"/>
+              </a:buClr>
+              <a:buSzPts val="1600"/>
+              <a:buFont typeface="Arial"/>
+              <a:buNone/>
+              <a:defRPr b="1" sz="1600"/>
+            </a:lvl7pPr>
+            <a:lvl8pPr indent="-228600" lvl="7" marL="3657600" rtl="0" algn="l">
+              <a:spcBef>
+                <a:spcPts val="320"/>
+              </a:spcBef>
+              <a:spcAft>
+                <a:spcPts val="0"/>
+              </a:spcAft>
+              <a:buClr>
+                <a:schemeClr val="dk1"/>
+              </a:buClr>
+              <a:buSzPts val="1600"/>
+              <a:buFont typeface="Arial"/>
+              <a:buNone/>
+              <a:defRPr b="1" sz="1600"/>
+            </a:lvl8pPr>
+            <a:lvl9pPr indent="-228600" lvl="8" marL="4114800" rtl="0" algn="l">
+              <a:spcBef>
+                <a:spcPts val="320"/>
+              </a:spcBef>
+              <a:spcAft>
+                <a:spcPts val="0"/>
+              </a:spcAft>
+              <a:buClr>
+                <a:schemeClr val="dk1"/>
+              </a:buClr>
+              <a:buSzPts val="1600"/>
+              <a:buFont typeface="Arial"/>
+              <a:buNone/>
+              <a:defRPr b="1" sz="1600"/>
+            </a:lvl9pPr>
+          </a:lstStyle>
+          <a:p/>
+        </p:txBody>
+      </p:sp>
+      <p:sp>
+        <p:nvSpPr>
+          <p:cNvPr id="69" name="Google Shape;69;p13"/>
+          <p:cNvSpPr txBox="1"/>
+          <p:nvPr>
+            <p:ph idx="4" type="body"/>
+          </p:nvPr>
+        </p:nvSpPr>
+        <p:spPr>
+          <a:xfrm>
+            <a:off x="4645025" y="2174875"/>
+            <a:ext cx="4041900" cy="3951300"/>
+          </a:xfrm>
+          <a:prstGeom prst="rect">
+            <a:avLst/>
+          </a:prstGeom>
+          <a:noFill/>
+          <a:ln>
+            <a:noFill/>
+          </a:ln>
+        </p:spPr>
+        <p:txBody>
+          <a:bodyPr anchorCtr="0" anchor="t" bIns="45700" lIns="91425" spcFirstLastPara="1" rIns="91425" wrap="square" tIns="45700">
+            <a:noAutofit/>
+          </a:bodyPr>
+          <a:lstStyle>
+            <a:lvl1pPr indent="-381000" lvl="0" marL="457200" rtl="0" algn="l">
+              <a:spcBef>
+                <a:spcPts val="480"/>
+              </a:spcBef>
+              <a:spcAft>
+                <a:spcPts val="0"/>
+              </a:spcAft>
+              <a:buClr>
+                <a:schemeClr val="dk1"/>
+              </a:buClr>
+              <a:buSzPts val="2400"/>
+              <a:buFont typeface="Arial"/>
+              <a:buChar char="•"/>
+              <a:defRPr sz="2400"/>
+            </a:lvl1pPr>
+            <a:lvl2pPr indent="-355600" lvl="1" marL="914400" rtl="0" algn="l">
+              <a:spcBef>
+                <a:spcPts val="400"/>
+              </a:spcBef>
+              <a:spcAft>
+                <a:spcPts val="0"/>
+              </a:spcAft>
+              <a:buClr>
+                <a:schemeClr val="dk1"/>
+              </a:buClr>
+              <a:buSzPts val="2000"/>
+              <a:buFont typeface="Arial"/>
+              <a:buChar char="–"/>
+              <a:defRPr sz="2000"/>
+            </a:lvl2pPr>
+            <a:lvl3pPr indent="-342900" lvl="2" marL="1371600" rtl="0" algn="l">
+              <a:spcBef>
+                <a:spcPts val="360"/>
+              </a:spcBef>
+              <a:spcAft>
+                <a:spcPts val="0"/>
+              </a:spcAft>
+              <a:buClr>
+                <a:schemeClr val="dk1"/>
+              </a:buClr>
+              <a:buSzPts val="1800"/>
+              <a:buFont typeface="Arial"/>
+              <a:buChar char="•"/>
+              <a:defRPr sz="1800"/>
+            </a:lvl3pPr>
+            <a:lvl4pPr indent="-330200" lvl="3" marL="1828800" rtl="0" algn="l">
+              <a:spcBef>
+                <a:spcPts val="320"/>
+              </a:spcBef>
+              <a:spcAft>
+                <a:spcPts val="0"/>
+              </a:spcAft>
+              <a:buClr>
+                <a:schemeClr val="dk1"/>
+              </a:buClr>
+              <a:buSzPts val="1600"/>
+              <a:buFont typeface="Arial"/>
+              <a:buChar char="–"/>
+              <a:defRPr sz="1600"/>
+            </a:lvl4pPr>
+            <a:lvl5pPr indent="-330200" lvl="4" marL="2286000" rtl="0" algn="l">
+              <a:spcBef>
+                <a:spcPts val="320"/>
+              </a:spcBef>
+              <a:spcAft>
+                <a:spcPts val="0"/>
+              </a:spcAft>
+              <a:buClr>
+                <a:schemeClr val="dk1"/>
+              </a:buClr>
+              <a:buSzPts val="1600"/>
+              <a:buFont typeface="Arial"/>
+              <a:buChar char="»"/>
+              <a:defRPr sz="1600"/>
+            </a:lvl5pPr>
+            <a:lvl6pPr indent="-330200" lvl="5" marL="2743200" rtl="0" algn="l">
+              <a:spcBef>
+                <a:spcPts val="320"/>
+              </a:spcBef>
+              <a:spcAft>
+                <a:spcPts val="0"/>
+              </a:spcAft>
+              <a:buClr>
+                <a:schemeClr val="dk1"/>
+              </a:buClr>
+              <a:buSzPts val="1600"/>
+              <a:buFont typeface="Arial"/>
+              <a:buChar char="»"/>
+              <a:defRPr sz="1600"/>
+            </a:lvl6pPr>
+            <a:lvl7pPr indent="-330200" lvl="6" marL="3200400" rtl="0" algn="l">
+              <a:spcBef>
+                <a:spcPts val="320"/>
+              </a:spcBef>
+              <a:spcAft>
+                <a:spcPts val="0"/>
+              </a:spcAft>
+              <a:buClr>
+                <a:schemeClr val="dk1"/>
+              </a:buClr>
+              <a:buSzPts val="1600"/>
+              <a:buFont typeface="Arial"/>
+              <a:buChar char="»"/>
+              <a:defRPr sz="1600"/>
+            </a:lvl7pPr>
+            <a:lvl8pPr indent="-330200" lvl="7" marL="3657600" rtl="0" algn="l">
+              <a:spcBef>
+                <a:spcPts val="320"/>
+              </a:spcBef>
+              <a:spcAft>
+                <a:spcPts val="0"/>
+              </a:spcAft>
+              <a:buClr>
+                <a:schemeClr val="dk1"/>
+              </a:buClr>
+              <a:buSzPts val="1600"/>
+              <a:buFont typeface="Arial"/>
+              <a:buChar char="»"/>
+              <a:defRPr sz="1600"/>
+            </a:lvl8pPr>
+            <a:lvl9pPr indent="-330200" lvl="8" marL="4114800" rtl="0" algn="l">
+              <a:spcBef>
+                <a:spcPts val="320"/>
+              </a:spcBef>
+              <a:spcAft>
+                <a:spcPts val="0"/>
+              </a:spcAft>
+              <a:buClr>
+                <a:schemeClr val="dk1"/>
+              </a:buClr>
+              <a:buSzPts val="1600"/>
+              <a:buFont typeface="Arial"/>
+              <a:buChar char="»"/>
+              <a:defRPr sz="1600"/>
+            </a:lvl9pPr>
+          </a:lstStyle>
+          <a:p/>
+        </p:txBody>
+      </p:sp>
+      <p:sp>
+        <p:nvSpPr>
+          <p:cNvPr id="70" name="Google Shape;70;p13"/>
+          <p:cNvSpPr txBox="1"/>
+          <p:nvPr>
+            <p:ph idx="10" type="dt"/>
+          </p:nvPr>
+        </p:nvSpPr>
+        <p:spPr>
+          <a:xfrm>
+            <a:off x="457200" y="6245225"/>
+            <a:ext cx="2133600" cy="476100"/>
+          </a:xfrm>
+          <a:prstGeom prst="rect">
+            <a:avLst/>
+          </a:prstGeom>
+          <a:noFill/>
+          <a:ln>
+            <a:noFill/>
+          </a:ln>
+        </p:spPr>
+        <p:txBody>
+          <a:bodyPr anchorCtr="0" anchor="t" bIns="45700" lIns="91425" spcFirstLastPara="1" rIns="91425" wrap="square" tIns="45700">
+            <a:noAutofit/>
+          </a:bodyPr>
+          <a:lstStyle>
+            <a:lvl1pPr lvl="0" rtl="0" algn="l">
+              <a:lnSpc>
+                <a:spcPct val="100000"/>
+              </a:lnSpc>
+              <a:spcBef>
+                <a:spcPts val="0"/>
+              </a:spcBef>
+              <a:spcAft>
+                <a:spcPts val="0"/>
+              </a:spcAft>
+              <a:buSzPts val="1400"/>
+              <a:buNone/>
+              <a:defRPr/>
+            </a:lvl1pPr>
+            <a:lvl2pPr lvl="1" rtl="0" algn="l">
+              <a:lnSpc>
+                <a:spcPct val="100000"/>
+              </a:lnSpc>
+              <a:spcBef>
+                <a:spcPts val="0"/>
+              </a:spcBef>
+              <a:spcAft>
+                <a:spcPts val="0"/>
+              </a:spcAft>
+              <a:buSzPts val="1400"/>
+              <a:buNone/>
+              <a:defRPr/>
+            </a:lvl2pPr>
+            <a:lvl3pPr lvl="2" rtl="0" algn="l">
+              <a:lnSpc>
+                <a:spcPct val="100000"/>
+              </a:lnSpc>
+              <a:spcBef>
+                <a:spcPts val="0"/>
+              </a:spcBef>
+              <a:spcAft>
+                <a:spcPts val="0"/>
+              </a:spcAft>
+              <a:buSzPts val="1400"/>
+              <a:buNone/>
+              <a:defRPr/>
+            </a:lvl3pPr>
+            <a:lvl4pPr lvl="3" rtl="0" algn="l">
+              <a:lnSpc>
+                <a:spcPct val="100000"/>
+              </a:lnSpc>
+              <a:spcBef>
+                <a:spcPts val="0"/>
+              </a:spcBef>
+              <a:spcAft>
+                <a:spcPts val="0"/>
+              </a:spcAft>
+              <a:buSzPts val="1400"/>
+              <a:buNone/>
+              <a:defRPr/>
+            </a:lvl4pPr>
+            <a:lvl5pPr lvl="4" rtl="0" algn="l">
+              <a:lnSpc>
+                <a:spcPct val="100000"/>
+              </a:lnSpc>
+              <a:spcBef>
+                <a:spcPts val="0"/>
+              </a:spcBef>
+              <a:spcAft>
+                <a:spcPts val="0"/>
+              </a:spcAft>
+              <a:buSzPts val="1400"/>
+              <a:buNone/>
+              <a:defRPr/>
+            </a:lvl5pPr>
+            <a:lvl6pPr lvl="5" rtl="0" algn="l">
+              <a:lnSpc>
+                <a:spcPct val="100000"/>
+              </a:lnSpc>
+              <a:spcBef>
+                <a:spcPts val="0"/>
+              </a:spcBef>
+              <a:spcAft>
+                <a:spcPts val="0"/>
+              </a:spcAft>
+              <a:buSzPts val="1400"/>
+              <a:buNone/>
+              <a:defRPr/>
+            </a:lvl6pPr>
+            <a:lvl7pPr lvl="6" rtl="0" algn="l">
+              <a:lnSpc>
+                <a:spcPct val="100000"/>
+              </a:lnSpc>
+              <a:spcBef>
+                <a:spcPts val="0"/>
+              </a:spcBef>
+              <a:spcAft>
+                <a:spcPts val="0"/>
+              </a:spcAft>
+              <a:buSzPts val="1400"/>
+              <a:buNone/>
+              <a:defRPr/>
+            </a:lvl7pPr>
+            <a:lvl8pPr lvl="7" rtl="0" algn="l">
+              <a:lnSpc>
+                <a:spcPct val="100000"/>
+              </a:lnSpc>
+              <a:spcBef>
+                <a:spcPts val="0"/>
+              </a:spcBef>
+              <a:spcAft>
+                <a:spcPts val="0"/>
+              </a:spcAft>
+              <a:buSzPts val="1400"/>
+              <a:buNone/>
+              <a:defRPr/>
+            </a:lvl8pPr>
+            <a:lvl9pPr lvl="8" rtl="0" algn="l">
+              <a:lnSpc>
+                <a:spcPct val="100000"/>
+              </a:lnSpc>
+              <a:spcBef>
+                <a:spcPts val="0"/>
+              </a:spcBef>
+              <a:spcAft>
+                <a:spcPts val="0"/>
+              </a:spcAft>
+              <a:buSzPts val="1400"/>
+              <a:buNone/>
+              <a:defRPr/>
+            </a:lvl9pPr>
+          </a:lstStyle>
+          <a:p/>
+        </p:txBody>
+      </p:sp>
+      <p:sp>
+        <p:nvSpPr>
+          <p:cNvPr id="71" name="Google Shape;71;p13"/>
+          <p:cNvSpPr txBox="1"/>
+          <p:nvPr>
+            <p:ph idx="11" type="ftr"/>
+          </p:nvPr>
+        </p:nvSpPr>
+        <p:spPr>
+          <a:xfrm>
+            <a:off x="3124200" y="6245225"/>
+            <a:ext cx="2895600" cy="476100"/>
+          </a:xfrm>
+          <a:prstGeom prst="rect">
+            <a:avLst/>
+          </a:prstGeom>
+          <a:noFill/>
+          <a:ln>
+            <a:noFill/>
+          </a:ln>
+        </p:spPr>
+        <p:txBody>
+          <a:bodyPr anchorCtr="0" anchor="t" bIns="45700" lIns="91425" spcFirstLastPara="1" rIns="91425" wrap="square" tIns="45700">
+            <a:noAutofit/>
+          </a:bodyPr>
+          <a:lstStyle>
+            <a:lvl1pPr lvl="0" rtl="0" algn="l">
+              <a:lnSpc>
+                <a:spcPct val="100000"/>
+              </a:lnSpc>
+              <a:spcBef>
+                <a:spcPts val="0"/>
+              </a:spcBef>
+              <a:spcAft>
+                <a:spcPts val="0"/>
+              </a:spcAft>
+              <a:buSzPts val="1400"/>
+              <a:buNone/>
+              <a:defRPr/>
+            </a:lvl1pPr>
+            <a:lvl2pPr lvl="1" rtl="0" algn="l">
+              <a:lnSpc>
+                <a:spcPct val="100000"/>
+              </a:lnSpc>
+              <a:spcBef>
+                <a:spcPts val="0"/>
+              </a:spcBef>
+              <a:spcAft>
+                <a:spcPts val="0"/>
+              </a:spcAft>
+              <a:buSzPts val="1400"/>
+              <a:buNone/>
+              <a:defRPr/>
+            </a:lvl2pPr>
+            <a:lvl3pPr lvl="2" rtl="0" algn="l">
+              <a:lnSpc>
+                <a:spcPct val="100000"/>
+              </a:lnSpc>
+              <a:spcBef>
+                <a:spcPts val="0"/>
+              </a:spcBef>
+              <a:spcAft>
+                <a:spcPts val="0"/>
+              </a:spcAft>
+              <a:buSzPts val="1400"/>
+              <a:buNone/>
+              <a:defRPr/>
+            </a:lvl3pPr>
+            <a:lvl4pPr lvl="3" rtl="0" algn="l">
+              <a:lnSpc>
+                <a:spcPct val="100000"/>
+              </a:lnSpc>
+              <a:spcBef>
+                <a:spcPts val="0"/>
+              </a:spcBef>
+              <a:spcAft>
+                <a:spcPts val="0"/>
+              </a:spcAft>
+              <a:buSzPts val="1400"/>
+              <a:buNone/>
+              <a:defRPr/>
+            </a:lvl4pPr>
+            <a:lvl5pPr lvl="4" rtl="0" algn="l">
+              <a:lnSpc>
+                <a:spcPct val="100000"/>
+              </a:lnSpc>
+              <a:spcBef>
+                <a:spcPts val="0"/>
+              </a:spcBef>
+              <a:spcAft>
+                <a:spcPts val="0"/>
+              </a:spcAft>
+              <a:buSzPts val="1400"/>
+              <a:buNone/>
+              <a:defRPr/>
+            </a:lvl5pPr>
+            <a:lvl6pPr lvl="5" rtl="0" algn="l">
+              <a:lnSpc>
+                <a:spcPct val="100000"/>
+              </a:lnSpc>
+              <a:spcBef>
+                <a:spcPts val="0"/>
+              </a:spcBef>
+              <a:spcAft>
+                <a:spcPts val="0"/>
+              </a:spcAft>
+              <a:buSzPts val="1400"/>
+              <a:buNone/>
+              <a:defRPr/>
+            </a:lvl6pPr>
+            <a:lvl7pPr lvl="6" rtl="0" algn="l">
+              <a:lnSpc>
+                <a:spcPct val="100000"/>
+              </a:lnSpc>
+              <a:spcBef>
+                <a:spcPts val="0"/>
+              </a:spcBef>
+              <a:spcAft>
+                <a:spcPts val="0"/>
+              </a:spcAft>
+              <a:buSzPts val="1400"/>
+              <a:buNone/>
+              <a:defRPr/>
+            </a:lvl7pPr>
+            <a:lvl8pPr lvl="7" rtl="0" algn="l">
+              <a:lnSpc>
+                <a:spcPct val="100000"/>
+              </a:lnSpc>
+              <a:spcBef>
+                <a:spcPts val="0"/>
+              </a:spcBef>
+              <a:spcAft>
+                <a:spcPts val="0"/>
+              </a:spcAft>
+              <a:buSzPts val="1400"/>
+              <a:buNone/>
+              <a:defRPr/>
+            </a:lvl8pPr>
+            <a:lvl9pPr lvl="8" rtl="0" algn="l">
+              <a:lnSpc>
+                <a:spcPct val="100000"/>
+              </a:lnSpc>
+              <a:spcBef>
+                <a:spcPts val="0"/>
+              </a:spcBef>
+              <a:spcAft>
+                <a:spcPts val="0"/>
+              </a:spcAft>
+              <a:buSzPts val="1400"/>
+              <a:buNone/>
+              <a:defRPr/>
+            </a:lvl9pPr>
+          </a:lstStyle>
+          <a:p/>
+        </p:txBody>
+      </p:sp>
+      <p:sp>
+        <p:nvSpPr>
+          <p:cNvPr id="72" name="Google Shape;72;p13"/>
+          <p:cNvSpPr txBox="1"/>
+          <p:nvPr>
+            <p:ph idx="12" type="sldNum"/>
+          </p:nvPr>
+        </p:nvSpPr>
+        <p:spPr>
+          <a:xfrm>
+            <a:off x="6553200" y="6245225"/>
+            <a:ext cx="2133600" cy="476100"/>
+          </a:xfrm>
+          <a:prstGeom prst="rect">
+            <a:avLst/>
+          </a:prstGeom>
+          <a:noFill/>
+          <a:ln>
+            <a:noFill/>
+          </a:ln>
+        </p:spPr>
+        <p:txBody>
+          <a:bodyPr anchorCtr="0" anchor="t" bIns="45700" lIns="91425" spcFirstLastPara="1" rIns="91425" wrap="square" tIns="45700">
+            <a:noAutofit/>
+          </a:bodyPr>
+          <a:lstStyle>
+            <a:lvl1pPr indent="0" lvl="0" marL="0" marR="0" rtl="0" algn="r">
+              <a:lnSpc>
+                <a:spcPct val="100000"/>
+              </a:lnSpc>
+              <a:spcBef>
+                <a:spcPts val="0"/>
+              </a:spcBef>
+              <a:spcAft>
+                <a:spcPts val="0"/>
+              </a:spcAft>
+              <a:buClr>
+                <a:schemeClr val="dk1"/>
+              </a:buClr>
+              <a:buSzPts val="1400"/>
+              <a:buFont typeface="Arial"/>
+              <a:buNone/>
+              <a:defRPr b="0" i="0" sz="1400" u="none" cap="none" strike="noStrike">
+                <a:solidFill>
+                  <a:schemeClr val="dk1"/>
+                </a:solidFill>
+                <a:latin typeface="Arial"/>
+                <a:ea typeface="Arial"/>
+                <a:cs typeface="Arial"/>
+                <a:sym typeface="Arial"/>
+              </a:defRPr>
+            </a:lvl1pPr>
+            <a:lvl2pPr indent="0" lvl="1" marL="0" marR="0" rtl="0" algn="r">
+              <a:lnSpc>
+                <a:spcPct val="100000"/>
+              </a:lnSpc>
+              <a:spcBef>
+                <a:spcPts val="0"/>
+              </a:spcBef>
+              <a:spcAft>
+                <a:spcPts val="0"/>
+              </a:spcAft>
+              <a:buClr>
+                <a:schemeClr val="dk1"/>
+              </a:buClr>
+              <a:buSzPts val="1400"/>
+              <a:buFont typeface="Arial"/>
+              <a:buNone/>
+              <a:defRPr b="0" i="0" sz="1400" u="none" cap="none" strike="noStrike">
+                <a:solidFill>
+                  <a:schemeClr val="dk1"/>
+                </a:solidFill>
+                <a:latin typeface="Arial"/>
+                <a:ea typeface="Arial"/>
+                <a:cs typeface="Arial"/>
+                <a:sym typeface="Arial"/>
+              </a:defRPr>
+            </a:lvl2pPr>
+            <a:lvl3pPr indent="0" lvl="2" marL="0" marR="0" rtl="0" algn="r">
+              <a:lnSpc>
+                <a:spcPct val="100000"/>
+              </a:lnSpc>
+              <a:spcBef>
+                <a:spcPts val="0"/>
+              </a:spcBef>
+              <a:spcAft>
+                <a:spcPts val="0"/>
+              </a:spcAft>
+              <a:buClr>
+                <a:schemeClr val="dk1"/>
+              </a:buClr>
+              <a:buSzPts val="1400"/>
+              <a:buFont typeface="Arial"/>
+              <a:buNone/>
+              <a:defRPr b="0" i="0" sz="1400" u="none" cap="none" strike="noStrike">
+                <a:solidFill>
+                  <a:schemeClr val="dk1"/>
+                </a:solidFill>
+                <a:latin typeface="Arial"/>
+                <a:ea typeface="Arial"/>
+                <a:cs typeface="Arial"/>
+                <a:sym typeface="Arial"/>
+              </a:defRPr>
+            </a:lvl3pPr>
+            <a:lvl4pPr indent="0" lvl="3" marL="0" marR="0" rtl="0" algn="r">
+              <a:lnSpc>
+                <a:spcPct val="100000"/>
+              </a:lnSpc>
+              <a:spcBef>
+                <a:spcPts val="0"/>
+              </a:spcBef>
+              <a:spcAft>
+                <a:spcPts val="0"/>
+              </a:spcAft>
+              <a:buClr>
+                <a:schemeClr val="dk1"/>
+              </a:buClr>
+              <a:buSzPts val="1400"/>
+              <a:buFont typeface="Arial"/>
+              <a:buNone/>
+              <a:defRPr b="0" i="0" sz="1400" u="none" cap="none" strike="noStrike">
+                <a:solidFill>
+                  <a:schemeClr val="dk1"/>
+                </a:solidFill>
+                <a:latin typeface="Arial"/>
+                <a:ea typeface="Arial"/>
+                <a:cs typeface="Arial"/>
+                <a:sym typeface="Arial"/>
+              </a:defRPr>
+            </a:lvl4pPr>
+            <a:lvl5pPr indent="0" lvl="4" marL="0" marR="0" rtl="0" algn="r">
+              <a:lnSpc>
+                <a:spcPct val="100000"/>
+              </a:lnSpc>
+              <a:spcBef>
+                <a:spcPts val="0"/>
+              </a:spcBef>
+              <a:spcAft>
+                <a:spcPts val="0"/>
+              </a:spcAft>
+              <a:buClr>
+                <a:schemeClr val="dk1"/>
+              </a:buClr>
+              <a:buSzPts val="1400"/>
+              <a:buFont typeface="Arial"/>
+              <a:buNone/>
+              <a:defRPr b="0" i="0" sz="1400" u="none" cap="none" strike="noStrike">
+                <a:solidFill>
+                  <a:schemeClr val="dk1"/>
+                </a:solidFill>
+                <a:latin typeface="Arial"/>
+                <a:ea typeface="Arial"/>
+                <a:cs typeface="Arial"/>
+                <a:sym typeface="Arial"/>
+              </a:defRPr>
+            </a:lvl5pPr>
+            <a:lvl6pPr indent="0" lvl="5" marL="0" marR="0" rtl="0" algn="r">
+              <a:lnSpc>
+                <a:spcPct val="100000"/>
+              </a:lnSpc>
+              <a:spcBef>
+                <a:spcPts val="0"/>
+              </a:spcBef>
+              <a:spcAft>
+                <a:spcPts val="0"/>
+              </a:spcAft>
+              <a:buClr>
+                <a:schemeClr val="dk1"/>
+              </a:buClr>
+              <a:buSzPts val="1400"/>
+              <a:buFont typeface="Arial"/>
+              <a:buNone/>
+              <a:defRPr b="0" i="0" sz="1400" u="none" cap="none" strike="noStrike">
+                <a:solidFill>
+                  <a:schemeClr val="dk1"/>
+                </a:solidFill>
+                <a:latin typeface="Arial"/>
+                <a:ea typeface="Arial"/>
+                <a:cs typeface="Arial"/>
+                <a:sym typeface="Arial"/>
+              </a:defRPr>
+            </a:lvl6pPr>
+            <a:lvl7pPr indent="0" lvl="6" marL="0" marR="0" rtl="0" algn="r">
+              <a:lnSpc>
+                <a:spcPct val="100000"/>
+              </a:lnSpc>
+              <a:spcBef>
+                <a:spcPts val="0"/>
+              </a:spcBef>
+              <a:spcAft>
+                <a:spcPts val="0"/>
+              </a:spcAft>
+              <a:buClr>
+                <a:schemeClr val="dk1"/>
+              </a:buClr>
+              <a:buSzPts val="1400"/>
+              <a:buFont typeface="Arial"/>
+              <a:buNone/>
+              <a:defRPr b="0" i="0" sz="1400" u="none" cap="none" strike="noStrike">
+                <a:solidFill>
+                  <a:schemeClr val="dk1"/>
+                </a:solidFill>
+                <a:latin typeface="Arial"/>
+                <a:ea typeface="Arial"/>
+                <a:cs typeface="Arial"/>
+                <a:sym typeface="Arial"/>
+              </a:defRPr>
+            </a:lvl7pPr>
+            <a:lvl8pPr indent="0" lvl="7" marL="0" marR="0" rtl="0" algn="r">
+              <a:lnSpc>
+                <a:spcPct val="100000"/>
+              </a:lnSpc>
+              <a:spcBef>
+                <a:spcPts val="0"/>
+              </a:spcBef>
+              <a:spcAft>
+                <a:spcPts val="0"/>
+              </a:spcAft>
+              <a:buClr>
+                <a:schemeClr val="dk1"/>
+              </a:buClr>
+              <a:buSzPts val="1400"/>
+              <a:buFont typeface="Arial"/>
+              <a:buNone/>
+              <a:defRPr b="0" i="0" sz="1400" u="none" cap="none" strike="noStrike">
+                <a:solidFill>
+                  <a:schemeClr val="dk1"/>
+                </a:solidFill>
+                <a:latin typeface="Arial"/>
+                <a:ea typeface="Arial"/>
+                <a:cs typeface="Arial"/>
+                <a:sym typeface="Arial"/>
+              </a:defRPr>
+            </a:lvl8pPr>
+            <a:lvl9pPr indent="0" lvl="8" marL="0" marR="0" rtl="0" algn="r">
+              <a:lnSpc>
+                <a:spcPct val="100000"/>
+              </a:lnSpc>
+              <a:spcBef>
+                <a:spcPts val="0"/>
+              </a:spcBef>
+              <a:spcAft>
+                <a:spcPts val="0"/>
+              </a:spcAft>
+              <a:buClr>
+                <a:schemeClr val="dk1"/>
+              </a:buClr>
+              <a:buSzPts val="1400"/>
+              <a:buFont typeface="Arial"/>
+              <a:buNone/>
+              <a:defRPr b="0" i="0" sz="1400" u="none" cap="none" strike="noStrike">
+                <a:solidFill>
+                  <a:schemeClr val="dk1"/>
+                </a:solidFill>
+                <a:latin typeface="Arial"/>
+                <a:ea typeface="Arial"/>
+                <a:cs typeface="Arial"/>
+                <a:sym typeface="Arial"/>
+              </a:defRPr>
+            </a:lvl9pPr>
+          </a:lstStyle>
+          <a:p>
+            <a:pPr indent="0" lvl="0" marL="0" rtl="0" algn="r">
+              <a:spcBef>
+                <a:spcPts val="0"/>
+              </a:spcBef>
+              <a:spcAft>
+                <a:spcPts val="0"/>
+              </a:spcAft>
+              <a:buNone/>
+            </a:pPr>
+            <a:fld id="{00000000-1234-1234-1234-123412341234}" type="slidenum">
+              <a:rPr lang="en-US"/>
+              <a:t>‹#›</a:t>
+            </a:fld>
+            <a:endParaRPr/>
+          </a:p>
+        </p:txBody>
+      </p:sp>
+    </p:spTree>
+  </p:cSld>
+  <p:clrMapOvr>
+    <a:masterClrMapping/>
+  </p:clrMapOvr>
+</p:sldLayout>
+</file>
+
+<file path=ppt/slideLayouts/slideLayout11.xml><?xml version="1.0" encoding="utf-8"?>
+<p:sldLayout xmlns:a="http://schemas.openxmlformats.org/drawingml/2006/main" xmlns:r="http://schemas.openxmlformats.org/officeDocument/2006/relationships" xmlns:mc="http://schemas.openxmlformats.org/markup-compatibility/2006" xmlns:mv="urn:schemas-microsoft-com:mac:vml" xmlns:p="http://schemas.openxmlformats.org/presentationml/2006/main" xmlns:c="http://schemas.openxmlformats.org/drawingml/2006/chart" xmlns:dgm="http://schemas.openxmlformats.org/drawingml/2006/diagram" xmlns:o="urn:schemas-microsoft-com:office:office" xmlns:v="urn:schemas-microsoft-com:vml" xmlns:pvml="urn:schemas-microsoft-com:office:powerpoint" xmlns:com="http://schemas.openxmlformats.org/drawingml/2006/compatibility" xmlns:p14="http://schemas.microsoft.com/office/powerpoint/2010/main" xmlns:p15="http://schemas.microsoft.com/office/powerpoint/2012/main" matchingName="İki İçerik" type="twoObj">
+  <p:cSld name="TWO_OBJECTS">
+    <p:spTree>
+      <p:nvGrpSpPr>
+        <p:cNvPr id="73" name="Shape 73"/>
+        <p:cNvGrpSpPr/>
+        <p:nvPr/>
+      </p:nvGrpSpPr>
+      <p:grpSpPr>
+        <a:xfrm>
+          <a:off x="0" y="0"/>
+          <a:ext cx="0" cy="0"/>
+          <a:chOff x="0" y="0"/>
+          <a:chExt cx="0" cy="0"/>
+        </a:xfrm>
+      </p:grpSpPr>
+      <p:sp>
+        <p:nvSpPr>
+          <p:cNvPr id="74" name="Google Shape;74;p14"/>
+          <p:cNvSpPr txBox="1"/>
+          <p:nvPr>
+            <p:ph type="title"/>
+          </p:nvPr>
+        </p:nvSpPr>
+        <p:spPr>
+          <a:xfrm>
+            <a:off x="457200" y="274637"/>
+            <a:ext cx="8229600" cy="1143000"/>
+          </a:xfrm>
+          <a:prstGeom prst="rect">
+            <a:avLst/>
+          </a:prstGeom>
+          <a:noFill/>
+          <a:ln>
+            <a:noFill/>
+          </a:ln>
+        </p:spPr>
+        <p:txBody>
+          <a:bodyPr anchorCtr="0" anchor="ctr" bIns="45700" lIns="91425" spcFirstLastPara="1" rIns="91425" wrap="square" tIns="45700">
+            <a:noAutofit/>
+          </a:bodyPr>
+          <a:lstStyle>
+            <a:lvl1pPr lvl="0" rtl="0" algn="ctr">
+              <a:spcBef>
+                <a:spcPts val="0"/>
+              </a:spcBef>
+              <a:spcAft>
+                <a:spcPts val="0"/>
+              </a:spcAft>
+              <a:buSzPts val="1400"/>
+              <a:buNone/>
+              <a:defRPr/>
+            </a:lvl1pPr>
+            <a:lvl2pPr lvl="1" rtl="0" algn="ctr">
+              <a:spcBef>
+                <a:spcPts val="0"/>
+              </a:spcBef>
+              <a:spcAft>
+                <a:spcPts val="0"/>
+              </a:spcAft>
+              <a:buSzPts val="1400"/>
+              <a:buNone/>
+              <a:defRPr/>
+            </a:lvl2pPr>
+            <a:lvl3pPr lvl="2" rtl="0" algn="ctr">
+              <a:spcBef>
+                <a:spcPts val="0"/>
+              </a:spcBef>
+              <a:spcAft>
+                <a:spcPts val="0"/>
+              </a:spcAft>
+              <a:buSzPts val="1400"/>
+              <a:buNone/>
+              <a:defRPr/>
+            </a:lvl3pPr>
+            <a:lvl4pPr lvl="3" rtl="0" algn="ctr">
+              <a:spcBef>
+                <a:spcPts val="0"/>
+              </a:spcBef>
+              <a:spcAft>
+                <a:spcPts val="0"/>
+              </a:spcAft>
+              <a:buSzPts val="1400"/>
+              <a:buNone/>
+              <a:defRPr/>
+            </a:lvl4pPr>
+            <a:lvl5pPr lvl="4" rtl="0" algn="ctr">
+              <a:spcBef>
+                <a:spcPts val="0"/>
+              </a:spcBef>
+              <a:spcAft>
+                <a:spcPts val="0"/>
+              </a:spcAft>
+              <a:buSzPts val="1400"/>
+              <a:buNone/>
+              <a:defRPr/>
+            </a:lvl5pPr>
+            <a:lvl6pPr lvl="5" rtl="0" algn="ctr">
+              <a:spcBef>
+                <a:spcPts val="0"/>
+              </a:spcBef>
+              <a:spcAft>
+                <a:spcPts val="0"/>
+              </a:spcAft>
+              <a:buSzPts val="1400"/>
+              <a:buNone/>
+              <a:defRPr/>
+            </a:lvl6pPr>
+            <a:lvl7pPr lvl="6" rtl="0" algn="ctr">
+              <a:spcBef>
+                <a:spcPts val="0"/>
+              </a:spcBef>
+              <a:spcAft>
+                <a:spcPts val="0"/>
+              </a:spcAft>
+              <a:buSzPts val="1400"/>
+              <a:buNone/>
+              <a:defRPr/>
+            </a:lvl7pPr>
+            <a:lvl8pPr lvl="7" rtl="0" algn="ctr">
+              <a:spcBef>
+                <a:spcPts val="0"/>
+              </a:spcBef>
+              <a:spcAft>
+                <a:spcPts val="0"/>
+              </a:spcAft>
+              <a:buSzPts val="1400"/>
+              <a:buNone/>
+              <a:defRPr/>
+            </a:lvl8pPr>
+            <a:lvl9pPr lvl="8" rtl="0" algn="ctr">
+              <a:spcBef>
+                <a:spcPts val="0"/>
+              </a:spcBef>
+              <a:spcAft>
+                <a:spcPts val="0"/>
+              </a:spcAft>
+              <a:buSzPts val="1400"/>
+              <a:buNone/>
+              <a:defRPr/>
+            </a:lvl9pPr>
+          </a:lstStyle>
+          <a:p/>
+        </p:txBody>
+      </p:sp>
+      <p:sp>
+        <p:nvSpPr>
+          <p:cNvPr id="75" name="Google Shape;75;p14"/>
           <p:cNvSpPr txBox="1"/>
           <p:nvPr>
             <p:ph idx="1" type="body"/>
@@ -2030,7 +3435,7 @@
       </p:sp>
       <p:sp>
         <p:nvSpPr>
-          <p:cNvPr id="70" name="Google Shape;70;p14"/>
+          <p:cNvPr id="76" name="Google Shape;76;p14"/>
           <p:cNvSpPr txBox="1"/>
           <p:nvPr>
             <p:ph idx="2" type="body"/>
@@ -2195,7 +3600,7 @@
       </p:sp>
       <p:sp>
         <p:nvSpPr>
-          <p:cNvPr id="71" name="Google Shape;71;p14"/>
+          <p:cNvPr id="77" name="Google Shape;77;p14"/>
           <p:cNvSpPr txBox="1"/>
           <p:nvPr>
             <p:ph idx="10" type="dt"/>
@@ -2351,7 +3756,7 @@
       </p:sp>
       <p:sp>
         <p:nvSpPr>
-          <p:cNvPr id="72" name="Google Shape;72;p14"/>
+          <p:cNvPr id="78" name="Google Shape;78;p14"/>
           <p:cNvSpPr txBox="1"/>
           <p:nvPr>
             <p:ph idx="11" type="ftr"/>
@@ -2507,7 +3912,7 @@
       </p:sp>
       <p:sp>
         <p:nvSpPr>
-          <p:cNvPr id="73" name="Google Shape;73;p14"/>
+          <p:cNvPr id="79" name="Google Shape;79;p14"/>
           <p:cNvSpPr txBox="1"/>
           <p:nvPr>
             <p:ph idx="12" type="sldNum"/>
@@ -2792,12 +4197,12 @@
 </p:sldLayout>
 </file>
 
-<file path=ppt/slideLayouts/slideLayout11.xml><?xml version="1.0" encoding="utf-8"?>
+<file path=ppt/slideLayouts/slideLayout12.xml><?xml version="1.0" encoding="utf-8"?>
 <p:sldLayout xmlns:a="http://schemas.openxmlformats.org/drawingml/2006/main" xmlns:r="http://schemas.openxmlformats.org/officeDocument/2006/relationships" xmlns:mc="http://schemas.openxmlformats.org/markup-compatibility/2006" xmlns:mv="urn:schemas-microsoft-com:mac:vml" xmlns:p="http://schemas.openxmlformats.org/presentationml/2006/main" xmlns:c="http://schemas.openxmlformats.org/drawingml/2006/chart" xmlns:dgm="http://schemas.openxmlformats.org/drawingml/2006/diagram" xmlns:o="urn:schemas-microsoft-com:office:office" xmlns:v="urn:schemas-microsoft-com:vml" xmlns:pvml="urn:schemas-microsoft-com:office:powerpoint" xmlns:com="http://schemas.openxmlformats.org/drawingml/2006/compatibility" xmlns:p14="http://schemas.microsoft.com/office/powerpoint/2010/main" xmlns:p15="http://schemas.microsoft.com/office/powerpoint/2012/main" matchingName="Bölüm Üstbilgisi" type="secHead">
   <p:cSld name="SECTION_HEADER">
     <p:spTree>
       <p:nvGrpSpPr>
-        <p:cNvPr id="74" name="Shape 74"/>
+        <p:cNvPr id="80" name="Shape 80"/>
         <p:cNvGrpSpPr/>
         <p:nvPr/>
       </p:nvGrpSpPr>
@@ -2811,7 +4216,7 @@
       </p:grpSpPr>
       <p:sp>
         <p:nvSpPr>
-          <p:cNvPr id="75" name="Google Shape;75;p15"/>
+          <p:cNvPr id="81" name="Google Shape;81;p15"/>
           <p:cNvSpPr txBox="1"/>
           <p:nvPr>
             <p:ph type="title"/>
@@ -2940,7 +4345,7 @@
       </p:sp>
       <p:sp>
         <p:nvSpPr>
-          <p:cNvPr id="76" name="Google Shape;76;p15"/>
+          <p:cNvPr id="82" name="Google Shape;82;p15"/>
           <p:cNvSpPr txBox="1"/>
           <p:nvPr>
             <p:ph idx="1" type="body"/>
@@ -3105,7 +4510,7 @@
       </p:sp>
       <p:sp>
         <p:nvSpPr>
-          <p:cNvPr id="77" name="Google Shape;77;p15"/>
+          <p:cNvPr id="83" name="Google Shape;83;p15"/>
           <p:cNvSpPr txBox="1"/>
           <p:nvPr>
             <p:ph idx="10" type="dt"/>
@@ -3261,7 +4666,7 @@
       </p:sp>
       <p:sp>
         <p:nvSpPr>
-          <p:cNvPr id="78" name="Google Shape;78;p15"/>
+          <p:cNvPr id="84" name="Google Shape;84;p15"/>
           <p:cNvSpPr txBox="1"/>
           <p:nvPr>
             <p:ph idx="11" type="ftr"/>
@@ -3417,7 +4822,7 @@
       </p:sp>
       <p:sp>
         <p:nvSpPr>
-          <p:cNvPr id="79" name="Google Shape;79;p15"/>
+          <p:cNvPr id="85" name="Google Shape;85;p15"/>
           <p:cNvSpPr txBox="1"/>
           <p:nvPr>
             <p:ph idx="12" type="sldNum"/>
@@ -3741,7 +5146,7 @@
         </p:nvSpPr>
         <p:spPr>
           <a:xfrm>
-            <a:off x="457200" y="274637"/>
+            <a:off x="457200" y="121887"/>
             <a:ext cx="8229600" cy="1143000"/>
           </a:xfrm>
           <a:prstGeom prst="rect">
@@ -3769,7 +5174,7 @@
               </a:buClr>
               <a:buSzPts val="3000"/>
               <a:buNone/>
-              <a:defRPr sz="3000">
+              <a:defRPr b="1" sz="3000">
                 <a:solidFill>
                   <a:schemeClr val="lt1"/>
                 </a:solidFill>
@@ -3877,8 +5282,8 @@
         </p:nvSpPr>
         <p:spPr>
           <a:xfrm>
-            <a:off x="457200" y="1600200"/>
-            <a:ext cx="8229600" cy="4526100"/>
+            <a:off x="457200" y="1326850"/>
+            <a:ext cx="8229600" cy="4852200"/>
           </a:xfrm>
           <a:prstGeom prst="rect">
             <a:avLst/>
@@ -3911,7 +5316,7 @@
                 </a:solidFill>
               </a:defRPr>
             </a:lvl1pPr>
-            <a:lvl2pPr indent="-342900" lvl="1" marL="914400" rtl="0" algn="l">
+            <a:lvl2pPr indent="-330200" lvl="1" marL="914400" rtl="0" algn="l">
               <a:spcBef>
                 <a:spcPts val="360"/>
               </a:spcBef>
@@ -3921,15 +5326,15 @@
               <a:buClr>
                 <a:schemeClr val="lt1"/>
               </a:buClr>
-              <a:buSzPts val="1800"/>
+              <a:buSzPts val="1600"/>
               <a:buChar char="–"/>
-              <a:defRPr sz="1800">
+              <a:defRPr sz="1600">
                 <a:solidFill>
                   <a:schemeClr val="lt1"/>
                 </a:solidFill>
               </a:defRPr>
             </a:lvl2pPr>
-            <a:lvl3pPr indent="-342900" lvl="2" marL="1371600" rtl="0" algn="l">
+            <a:lvl3pPr indent="-317500" lvl="2" marL="1371600" rtl="0" algn="l">
               <a:spcBef>
                 <a:spcPts val="360"/>
               </a:spcBef>
@@ -3939,15 +5344,15 @@
               <a:buClr>
                 <a:schemeClr val="lt1"/>
               </a:buClr>
-              <a:buSzPts val="1800"/>
+              <a:buSzPts val="1400"/>
               <a:buChar char="•"/>
-              <a:defRPr sz="1800">
+              <a:defRPr sz="1400">
                 <a:solidFill>
                   <a:schemeClr val="lt1"/>
                 </a:solidFill>
               </a:defRPr>
             </a:lvl3pPr>
-            <a:lvl4pPr indent="-342900" lvl="3" marL="1828800" rtl="0" algn="l">
+            <a:lvl4pPr indent="-304800" lvl="3" marL="1828800" rtl="0" algn="l">
               <a:spcBef>
                 <a:spcPts val="360"/>
               </a:spcBef>
@@ -3957,15 +5362,15 @@
               <a:buClr>
                 <a:schemeClr val="lt1"/>
               </a:buClr>
-              <a:buSzPts val="1800"/>
+              <a:buSzPts val="1200"/>
               <a:buChar char="–"/>
-              <a:defRPr sz="1800">
+              <a:defRPr sz="1200">
                 <a:solidFill>
                   <a:schemeClr val="lt1"/>
                 </a:solidFill>
               </a:defRPr>
             </a:lvl4pPr>
-            <a:lvl5pPr indent="-342900" lvl="4" marL="2286000" rtl="0" algn="l">
+            <a:lvl5pPr indent="-298450" lvl="4" marL="2286000" rtl="0" algn="l">
               <a:spcBef>
                 <a:spcPts val="360"/>
               </a:spcBef>
@@ -3975,15 +5380,15 @@
               <a:buClr>
                 <a:schemeClr val="lt1"/>
               </a:buClr>
-              <a:buSzPts val="1800"/>
+              <a:buSzPts val="1100"/>
               <a:buChar char="»"/>
-              <a:defRPr sz="1800">
+              <a:defRPr sz="1100">
                 <a:solidFill>
                   <a:schemeClr val="lt1"/>
                 </a:solidFill>
               </a:defRPr>
             </a:lvl5pPr>
-            <a:lvl6pPr indent="-342900" lvl="5" marL="2743200" rtl="0" algn="l">
+            <a:lvl6pPr indent="-292100" lvl="5" marL="2743200" rtl="0" algn="l">
               <a:spcBef>
                 <a:spcPts val="360"/>
               </a:spcBef>
@@ -3993,15 +5398,15 @@
               <a:buClr>
                 <a:schemeClr val="lt1"/>
               </a:buClr>
-              <a:buSzPts val="1800"/>
+              <a:buSzPts val="1000"/>
               <a:buChar char="»"/>
-              <a:defRPr sz="1800">
+              <a:defRPr sz="1000">
                 <a:solidFill>
                   <a:schemeClr val="lt1"/>
                 </a:solidFill>
               </a:defRPr>
             </a:lvl6pPr>
-            <a:lvl7pPr indent="-342900" lvl="6" marL="3200400" rtl="0" algn="l">
+            <a:lvl7pPr indent="-292100" lvl="6" marL="3200400" rtl="0" algn="l">
               <a:spcBef>
                 <a:spcPts val="360"/>
               </a:spcBef>
@@ -4011,15 +5416,15 @@
               <a:buClr>
                 <a:schemeClr val="lt1"/>
               </a:buClr>
-              <a:buSzPts val="1800"/>
+              <a:buSzPts val="1000"/>
               <a:buChar char="»"/>
-              <a:defRPr sz="1800">
+              <a:defRPr sz="1000">
                 <a:solidFill>
                   <a:schemeClr val="lt1"/>
                 </a:solidFill>
               </a:defRPr>
             </a:lvl7pPr>
-            <a:lvl8pPr indent="-342900" lvl="7" marL="3657600" rtl="0" algn="l">
+            <a:lvl8pPr indent="-285750" lvl="7" marL="3657600" rtl="0" algn="l">
               <a:spcBef>
                 <a:spcPts val="360"/>
               </a:spcBef>
@@ -4029,15 +5434,15 @@
               <a:buClr>
                 <a:schemeClr val="lt1"/>
               </a:buClr>
-              <a:buSzPts val="1800"/>
+              <a:buSzPts val="900"/>
               <a:buChar char="»"/>
-              <a:defRPr sz="1800">
+              <a:defRPr sz="900">
                 <a:solidFill>
                   <a:schemeClr val="lt1"/>
                 </a:solidFill>
               </a:defRPr>
             </a:lvl8pPr>
-            <a:lvl9pPr indent="-342900" lvl="8" marL="4114800" rtl="0" algn="l">
+            <a:lvl9pPr indent="-279400" lvl="8" marL="4114800" rtl="0" algn="l">
               <a:spcBef>
                 <a:spcPts val="360"/>
               </a:spcBef>
@@ -4047,9 +5452,9 @@
               <a:buClr>
                 <a:schemeClr val="lt1"/>
               </a:buClr>
-              <a:buSzPts val="1800"/>
+              <a:buSzPts val="800"/>
               <a:buChar char="»"/>
-              <a:defRPr sz="1800">
+              <a:defRPr sz="800">
                 <a:solidFill>
                   <a:schemeClr val="lt1"/>
                 </a:solidFill>
@@ -4659,8 +6064,20 @@
 </file>
 
 <file path=ppt/slideLayouts/slideLayout3.xml><?xml version="1.0" encoding="utf-8"?>
-<p:sldLayout xmlns:a="http://schemas.openxmlformats.org/drawingml/2006/main" xmlns:r="http://schemas.openxmlformats.org/officeDocument/2006/relationships" xmlns:mc="http://schemas.openxmlformats.org/markup-compatibility/2006" xmlns:mv="urn:schemas-microsoft-com:mac:vml" xmlns:p="http://schemas.openxmlformats.org/presentationml/2006/main" xmlns:c="http://schemas.openxmlformats.org/drawingml/2006/chart" xmlns:dgm="http://schemas.openxmlformats.org/drawingml/2006/diagram" xmlns:o="urn:schemas-microsoft-com:office:office" xmlns:v="urn:schemas-microsoft-com:vml" xmlns:pvml="urn:schemas-microsoft-com:office:powerpoint" xmlns:com="http://schemas.openxmlformats.org/drawingml/2006/compatibility" xmlns:p14="http://schemas.microsoft.com/office/powerpoint/2010/main" xmlns:p15="http://schemas.microsoft.com/office/powerpoint/2012/main" matchingName="Dikey Başlık ve Metin" type="vertTitleAndTx">
-  <p:cSld name="VERTICAL_TITLE_AND_VERTICAL_TEXT">
+<p:sldLayout xmlns:a="http://schemas.openxmlformats.org/drawingml/2006/main" xmlns:r="http://schemas.openxmlformats.org/officeDocument/2006/relationships" xmlns:mc="http://schemas.openxmlformats.org/markup-compatibility/2006" xmlns:mv="urn:schemas-microsoft-com:mac:vml" xmlns:p="http://schemas.openxmlformats.org/presentationml/2006/main" xmlns:c="http://schemas.openxmlformats.org/drawingml/2006/chart" xmlns:dgm="http://schemas.openxmlformats.org/drawingml/2006/diagram" xmlns:o="urn:schemas-microsoft-com:office:office" xmlns:v="urn:schemas-microsoft-com:vml" xmlns:pvml="urn:schemas-microsoft-com:office:powerpoint" xmlns:com="http://schemas.openxmlformats.org/drawingml/2006/compatibility" xmlns:p14="http://schemas.microsoft.com/office/powerpoint/2010/main" xmlns:p15="http://schemas.microsoft.com/office/powerpoint/2012/main" matchingName="layout 1 1">
+  <p:cSld name="OBJECT_1">
+    <p:bg>
+      <p:bgPr>
+        <a:blipFill>
+          <a:blip r:embed="rId2">
+            <a:alphaModFix/>
+          </a:blip>
+          <a:stretch>
+            <a:fillRect/>
+          </a:stretch>
+        </a:blipFill>
+      </p:bgPr>
+    </p:bg>
     <p:spTree>
       <p:nvGrpSpPr>
         <p:cNvPr id="23" name="Shape 23"/>
@@ -4677,7 +6094,951 @@
       </p:grpSpPr>
       <p:sp>
         <p:nvSpPr>
-          <p:cNvPr id="24" name="Google Shape;24;p7"/>
+          <p:cNvPr id="24" name="Google Shape;24;g6baf4b0859_0_6"/>
+          <p:cNvSpPr txBox="1"/>
+          <p:nvPr>
+            <p:ph type="title"/>
+          </p:nvPr>
+        </p:nvSpPr>
+        <p:spPr>
+          <a:xfrm>
+            <a:off x="457200" y="121887"/>
+            <a:ext cx="8229600" cy="1143000"/>
+          </a:xfrm>
+          <a:prstGeom prst="rect">
+            <a:avLst/>
+          </a:prstGeom>
+          <a:noFill/>
+          <a:ln>
+            <a:noFill/>
+          </a:ln>
+        </p:spPr>
+        <p:txBody>
+          <a:bodyPr anchorCtr="0" anchor="ctr" bIns="45700" lIns="91425" spcFirstLastPara="1" rIns="91425" wrap="square" tIns="45700">
+            <a:noAutofit/>
+          </a:bodyPr>
+          <a:lstStyle>
+            <a:lvl1pPr lvl="0" rtl="0" algn="ctr">
+              <a:spcBef>
+                <a:spcPts val="0"/>
+              </a:spcBef>
+              <a:spcAft>
+                <a:spcPts val="0"/>
+              </a:spcAft>
+              <a:buClr>
+                <a:schemeClr val="lt1"/>
+              </a:buClr>
+              <a:buSzPts val="3000"/>
+              <a:buNone/>
+              <a:defRPr b="1" sz="3000">
+                <a:solidFill>
+                  <a:schemeClr val="lt1"/>
+                </a:solidFill>
+              </a:defRPr>
+            </a:lvl1pPr>
+            <a:lvl2pPr lvl="1" rtl="0" algn="ctr">
+              <a:spcBef>
+                <a:spcPts val="0"/>
+              </a:spcBef>
+              <a:spcAft>
+                <a:spcPts val="0"/>
+              </a:spcAft>
+              <a:buSzPts val="1400"/>
+              <a:buNone/>
+              <a:defRPr/>
+            </a:lvl2pPr>
+            <a:lvl3pPr lvl="2" rtl="0" algn="ctr">
+              <a:spcBef>
+                <a:spcPts val="0"/>
+              </a:spcBef>
+              <a:spcAft>
+                <a:spcPts val="0"/>
+              </a:spcAft>
+              <a:buSzPts val="1400"/>
+              <a:buNone/>
+              <a:defRPr/>
+            </a:lvl3pPr>
+            <a:lvl4pPr lvl="3" rtl="0" algn="ctr">
+              <a:spcBef>
+                <a:spcPts val="0"/>
+              </a:spcBef>
+              <a:spcAft>
+                <a:spcPts val="0"/>
+              </a:spcAft>
+              <a:buSzPts val="1400"/>
+              <a:buNone/>
+              <a:defRPr/>
+            </a:lvl4pPr>
+            <a:lvl5pPr lvl="4" rtl="0" algn="ctr">
+              <a:spcBef>
+                <a:spcPts val="0"/>
+              </a:spcBef>
+              <a:spcAft>
+                <a:spcPts val="0"/>
+              </a:spcAft>
+              <a:buSzPts val="1400"/>
+              <a:buNone/>
+              <a:defRPr/>
+            </a:lvl5pPr>
+            <a:lvl6pPr lvl="5" rtl="0" algn="ctr">
+              <a:spcBef>
+                <a:spcPts val="0"/>
+              </a:spcBef>
+              <a:spcAft>
+                <a:spcPts val="0"/>
+              </a:spcAft>
+              <a:buSzPts val="1400"/>
+              <a:buNone/>
+              <a:defRPr/>
+            </a:lvl6pPr>
+            <a:lvl7pPr lvl="6" rtl="0" algn="ctr">
+              <a:spcBef>
+                <a:spcPts val="0"/>
+              </a:spcBef>
+              <a:spcAft>
+                <a:spcPts val="0"/>
+              </a:spcAft>
+              <a:buSzPts val="1400"/>
+              <a:buNone/>
+              <a:defRPr/>
+            </a:lvl7pPr>
+            <a:lvl8pPr lvl="7" rtl="0" algn="ctr">
+              <a:spcBef>
+                <a:spcPts val="0"/>
+              </a:spcBef>
+              <a:spcAft>
+                <a:spcPts val="0"/>
+              </a:spcAft>
+              <a:buSzPts val="1400"/>
+              <a:buNone/>
+              <a:defRPr/>
+            </a:lvl8pPr>
+            <a:lvl9pPr lvl="8" rtl="0" algn="ctr">
+              <a:spcBef>
+                <a:spcPts val="0"/>
+              </a:spcBef>
+              <a:spcAft>
+                <a:spcPts val="0"/>
+              </a:spcAft>
+              <a:buSzPts val="1400"/>
+              <a:buNone/>
+              <a:defRPr/>
+            </a:lvl9pPr>
+          </a:lstStyle>
+          <a:p/>
+        </p:txBody>
+      </p:sp>
+      <p:sp>
+        <p:nvSpPr>
+          <p:cNvPr id="25" name="Google Shape;25;g6baf4b0859_0_6"/>
+          <p:cNvSpPr txBox="1"/>
+          <p:nvPr>
+            <p:ph idx="1" type="body"/>
+          </p:nvPr>
+        </p:nvSpPr>
+        <p:spPr>
+          <a:xfrm>
+            <a:off x="457200" y="1326850"/>
+            <a:ext cx="8229600" cy="4852200"/>
+          </a:xfrm>
+          <a:prstGeom prst="rect">
+            <a:avLst/>
+          </a:prstGeom>
+          <a:noFill/>
+          <a:ln>
+            <a:noFill/>
+          </a:ln>
+        </p:spPr>
+        <p:txBody>
+          <a:bodyPr anchorCtr="0" anchor="t" bIns="45700" lIns="91425" spcFirstLastPara="1" rIns="91425" wrap="square" tIns="45700">
+            <a:noAutofit/>
+          </a:bodyPr>
+          <a:lstStyle>
+            <a:lvl1pPr indent="-342900" lvl="0" marL="457200" rtl="0" algn="l">
+              <a:spcBef>
+                <a:spcPts val="360"/>
+              </a:spcBef>
+              <a:spcAft>
+                <a:spcPts val="0"/>
+              </a:spcAft>
+              <a:buClr>
+                <a:schemeClr val="lt1"/>
+              </a:buClr>
+              <a:buSzPts val="1800"/>
+              <a:buChar char="•"/>
+              <a:defRPr sz="1800">
+                <a:solidFill>
+                  <a:schemeClr val="lt1"/>
+                </a:solidFill>
+              </a:defRPr>
+            </a:lvl1pPr>
+            <a:lvl2pPr indent="-330200" lvl="1" marL="914400" rtl="0" algn="l">
+              <a:spcBef>
+                <a:spcPts val="360"/>
+              </a:spcBef>
+              <a:spcAft>
+                <a:spcPts val="0"/>
+              </a:spcAft>
+              <a:buClr>
+                <a:schemeClr val="lt1"/>
+              </a:buClr>
+              <a:buSzPts val="1600"/>
+              <a:buChar char="–"/>
+              <a:defRPr sz="1600">
+                <a:solidFill>
+                  <a:schemeClr val="lt1"/>
+                </a:solidFill>
+              </a:defRPr>
+            </a:lvl2pPr>
+            <a:lvl3pPr indent="-317500" lvl="2" marL="1371600" rtl="0" algn="l">
+              <a:spcBef>
+                <a:spcPts val="360"/>
+              </a:spcBef>
+              <a:spcAft>
+                <a:spcPts val="0"/>
+              </a:spcAft>
+              <a:buClr>
+                <a:schemeClr val="lt1"/>
+              </a:buClr>
+              <a:buSzPts val="1400"/>
+              <a:buChar char="•"/>
+              <a:defRPr sz="1400">
+                <a:solidFill>
+                  <a:schemeClr val="lt1"/>
+                </a:solidFill>
+              </a:defRPr>
+            </a:lvl3pPr>
+            <a:lvl4pPr indent="-304800" lvl="3" marL="1828800" rtl="0" algn="l">
+              <a:spcBef>
+                <a:spcPts val="360"/>
+              </a:spcBef>
+              <a:spcAft>
+                <a:spcPts val="0"/>
+              </a:spcAft>
+              <a:buClr>
+                <a:schemeClr val="lt1"/>
+              </a:buClr>
+              <a:buSzPts val="1200"/>
+              <a:buChar char="–"/>
+              <a:defRPr sz="1200">
+                <a:solidFill>
+                  <a:schemeClr val="lt1"/>
+                </a:solidFill>
+              </a:defRPr>
+            </a:lvl4pPr>
+            <a:lvl5pPr indent="-298450" lvl="4" marL="2286000" rtl="0" algn="l">
+              <a:spcBef>
+                <a:spcPts val="360"/>
+              </a:spcBef>
+              <a:spcAft>
+                <a:spcPts val="0"/>
+              </a:spcAft>
+              <a:buClr>
+                <a:schemeClr val="lt1"/>
+              </a:buClr>
+              <a:buSzPts val="1100"/>
+              <a:buChar char="»"/>
+              <a:defRPr sz="1100">
+                <a:solidFill>
+                  <a:schemeClr val="lt1"/>
+                </a:solidFill>
+              </a:defRPr>
+            </a:lvl5pPr>
+            <a:lvl6pPr indent="-292100" lvl="5" marL="2743200" rtl="0" algn="l">
+              <a:spcBef>
+                <a:spcPts val="360"/>
+              </a:spcBef>
+              <a:spcAft>
+                <a:spcPts val="0"/>
+              </a:spcAft>
+              <a:buClr>
+                <a:schemeClr val="lt1"/>
+              </a:buClr>
+              <a:buSzPts val="1000"/>
+              <a:buChar char="»"/>
+              <a:defRPr sz="1000">
+                <a:solidFill>
+                  <a:schemeClr val="lt1"/>
+                </a:solidFill>
+              </a:defRPr>
+            </a:lvl6pPr>
+            <a:lvl7pPr indent="-292100" lvl="6" marL="3200400" rtl="0" algn="l">
+              <a:spcBef>
+                <a:spcPts val="360"/>
+              </a:spcBef>
+              <a:spcAft>
+                <a:spcPts val="0"/>
+              </a:spcAft>
+              <a:buClr>
+                <a:schemeClr val="lt1"/>
+              </a:buClr>
+              <a:buSzPts val="1000"/>
+              <a:buChar char="»"/>
+              <a:defRPr sz="1000">
+                <a:solidFill>
+                  <a:schemeClr val="lt1"/>
+                </a:solidFill>
+              </a:defRPr>
+            </a:lvl7pPr>
+            <a:lvl8pPr indent="-285750" lvl="7" marL="3657600" rtl="0" algn="l">
+              <a:spcBef>
+                <a:spcPts val="360"/>
+              </a:spcBef>
+              <a:spcAft>
+                <a:spcPts val="0"/>
+              </a:spcAft>
+              <a:buClr>
+                <a:schemeClr val="lt1"/>
+              </a:buClr>
+              <a:buSzPts val="900"/>
+              <a:buChar char="»"/>
+              <a:defRPr sz="900">
+                <a:solidFill>
+                  <a:schemeClr val="lt1"/>
+                </a:solidFill>
+              </a:defRPr>
+            </a:lvl8pPr>
+            <a:lvl9pPr indent="-279400" lvl="8" marL="4114800" rtl="0" algn="l">
+              <a:spcBef>
+                <a:spcPts val="360"/>
+              </a:spcBef>
+              <a:spcAft>
+                <a:spcPts val="0"/>
+              </a:spcAft>
+              <a:buClr>
+                <a:schemeClr val="lt1"/>
+              </a:buClr>
+              <a:buSzPts val="800"/>
+              <a:buChar char="»"/>
+              <a:defRPr sz="800">
+                <a:solidFill>
+                  <a:schemeClr val="lt1"/>
+                </a:solidFill>
+              </a:defRPr>
+            </a:lvl9pPr>
+          </a:lstStyle>
+          <a:p/>
+        </p:txBody>
+      </p:sp>
+      <p:sp>
+        <p:nvSpPr>
+          <p:cNvPr id="26" name="Google Shape;26;g6baf4b0859_0_6"/>
+          <p:cNvSpPr txBox="1"/>
+          <p:nvPr>
+            <p:ph idx="10" type="dt"/>
+          </p:nvPr>
+        </p:nvSpPr>
+        <p:spPr>
+          <a:xfrm>
+            <a:off x="457200" y="6245225"/>
+            <a:ext cx="2133600" cy="476100"/>
+          </a:xfrm>
+          <a:prstGeom prst="rect">
+            <a:avLst/>
+          </a:prstGeom>
+          <a:noFill/>
+          <a:ln>
+            <a:noFill/>
+          </a:ln>
+        </p:spPr>
+        <p:txBody>
+          <a:bodyPr anchorCtr="0" anchor="t" bIns="45700" lIns="91425" spcFirstLastPara="1" rIns="91425" wrap="square" tIns="45700">
+            <a:noAutofit/>
+          </a:bodyPr>
+          <a:lstStyle>
+            <a:lvl1pPr lvl="0" rtl="0" algn="l">
+              <a:lnSpc>
+                <a:spcPct val="100000"/>
+              </a:lnSpc>
+              <a:spcBef>
+                <a:spcPts val="0"/>
+              </a:spcBef>
+              <a:spcAft>
+                <a:spcPts val="0"/>
+              </a:spcAft>
+              <a:buSzPts val="1400"/>
+              <a:buNone/>
+              <a:defRPr/>
+            </a:lvl1pPr>
+            <a:lvl2pPr lvl="1" rtl="0" algn="l">
+              <a:lnSpc>
+                <a:spcPct val="100000"/>
+              </a:lnSpc>
+              <a:spcBef>
+                <a:spcPts val="0"/>
+              </a:spcBef>
+              <a:spcAft>
+                <a:spcPts val="0"/>
+              </a:spcAft>
+              <a:buSzPts val="1400"/>
+              <a:buNone/>
+              <a:defRPr/>
+            </a:lvl2pPr>
+            <a:lvl3pPr lvl="2" rtl="0" algn="l">
+              <a:lnSpc>
+                <a:spcPct val="100000"/>
+              </a:lnSpc>
+              <a:spcBef>
+                <a:spcPts val="0"/>
+              </a:spcBef>
+              <a:spcAft>
+                <a:spcPts val="0"/>
+              </a:spcAft>
+              <a:buSzPts val="1400"/>
+              <a:buNone/>
+              <a:defRPr/>
+            </a:lvl3pPr>
+            <a:lvl4pPr lvl="3" rtl="0" algn="l">
+              <a:lnSpc>
+                <a:spcPct val="100000"/>
+              </a:lnSpc>
+              <a:spcBef>
+                <a:spcPts val="0"/>
+              </a:spcBef>
+              <a:spcAft>
+                <a:spcPts val="0"/>
+              </a:spcAft>
+              <a:buSzPts val="1400"/>
+              <a:buNone/>
+              <a:defRPr/>
+            </a:lvl4pPr>
+            <a:lvl5pPr lvl="4" rtl="0" algn="l">
+              <a:lnSpc>
+                <a:spcPct val="100000"/>
+              </a:lnSpc>
+              <a:spcBef>
+                <a:spcPts val="0"/>
+              </a:spcBef>
+              <a:spcAft>
+                <a:spcPts val="0"/>
+              </a:spcAft>
+              <a:buSzPts val="1400"/>
+              <a:buNone/>
+              <a:defRPr/>
+            </a:lvl5pPr>
+            <a:lvl6pPr lvl="5" rtl="0" algn="l">
+              <a:lnSpc>
+                <a:spcPct val="100000"/>
+              </a:lnSpc>
+              <a:spcBef>
+                <a:spcPts val="0"/>
+              </a:spcBef>
+              <a:spcAft>
+                <a:spcPts val="0"/>
+              </a:spcAft>
+              <a:buSzPts val="1400"/>
+              <a:buNone/>
+              <a:defRPr/>
+            </a:lvl6pPr>
+            <a:lvl7pPr lvl="6" rtl="0" algn="l">
+              <a:lnSpc>
+                <a:spcPct val="100000"/>
+              </a:lnSpc>
+              <a:spcBef>
+                <a:spcPts val="0"/>
+              </a:spcBef>
+              <a:spcAft>
+                <a:spcPts val="0"/>
+              </a:spcAft>
+              <a:buSzPts val="1400"/>
+              <a:buNone/>
+              <a:defRPr/>
+            </a:lvl7pPr>
+            <a:lvl8pPr lvl="7" rtl="0" algn="l">
+              <a:lnSpc>
+                <a:spcPct val="100000"/>
+              </a:lnSpc>
+              <a:spcBef>
+                <a:spcPts val="0"/>
+              </a:spcBef>
+              <a:spcAft>
+                <a:spcPts val="0"/>
+              </a:spcAft>
+              <a:buSzPts val="1400"/>
+              <a:buNone/>
+              <a:defRPr/>
+            </a:lvl8pPr>
+            <a:lvl9pPr lvl="8" rtl="0" algn="l">
+              <a:lnSpc>
+                <a:spcPct val="100000"/>
+              </a:lnSpc>
+              <a:spcBef>
+                <a:spcPts val="0"/>
+              </a:spcBef>
+              <a:spcAft>
+                <a:spcPts val="0"/>
+              </a:spcAft>
+              <a:buSzPts val="1400"/>
+              <a:buNone/>
+              <a:defRPr/>
+            </a:lvl9pPr>
+          </a:lstStyle>
+          <a:p/>
+        </p:txBody>
+      </p:sp>
+      <p:sp>
+        <p:nvSpPr>
+          <p:cNvPr id="27" name="Google Shape;27;g6baf4b0859_0_6"/>
+          <p:cNvSpPr txBox="1"/>
+          <p:nvPr>
+            <p:ph idx="11" type="ftr"/>
+          </p:nvPr>
+        </p:nvSpPr>
+        <p:spPr>
+          <a:xfrm>
+            <a:off x="3124200" y="6245225"/>
+            <a:ext cx="2895600" cy="476100"/>
+          </a:xfrm>
+          <a:prstGeom prst="rect">
+            <a:avLst/>
+          </a:prstGeom>
+          <a:noFill/>
+          <a:ln>
+            <a:noFill/>
+          </a:ln>
+        </p:spPr>
+        <p:txBody>
+          <a:bodyPr anchorCtr="0" anchor="t" bIns="45700" lIns="91425" spcFirstLastPara="1" rIns="91425" wrap="square" tIns="45700">
+            <a:noAutofit/>
+          </a:bodyPr>
+          <a:lstStyle>
+            <a:lvl1pPr lvl="0" rtl="0" algn="l">
+              <a:lnSpc>
+                <a:spcPct val="100000"/>
+              </a:lnSpc>
+              <a:spcBef>
+                <a:spcPts val="0"/>
+              </a:spcBef>
+              <a:spcAft>
+                <a:spcPts val="0"/>
+              </a:spcAft>
+              <a:buSzPts val="1400"/>
+              <a:buNone/>
+              <a:defRPr/>
+            </a:lvl1pPr>
+            <a:lvl2pPr lvl="1" rtl="0" algn="l">
+              <a:lnSpc>
+                <a:spcPct val="100000"/>
+              </a:lnSpc>
+              <a:spcBef>
+                <a:spcPts val="0"/>
+              </a:spcBef>
+              <a:spcAft>
+                <a:spcPts val="0"/>
+              </a:spcAft>
+              <a:buSzPts val="1400"/>
+              <a:buNone/>
+              <a:defRPr/>
+            </a:lvl2pPr>
+            <a:lvl3pPr lvl="2" rtl="0" algn="l">
+              <a:lnSpc>
+                <a:spcPct val="100000"/>
+              </a:lnSpc>
+              <a:spcBef>
+                <a:spcPts val="0"/>
+              </a:spcBef>
+              <a:spcAft>
+                <a:spcPts val="0"/>
+              </a:spcAft>
+              <a:buSzPts val="1400"/>
+              <a:buNone/>
+              <a:defRPr/>
+            </a:lvl3pPr>
+            <a:lvl4pPr lvl="3" rtl="0" algn="l">
+              <a:lnSpc>
+                <a:spcPct val="100000"/>
+              </a:lnSpc>
+              <a:spcBef>
+                <a:spcPts val="0"/>
+              </a:spcBef>
+              <a:spcAft>
+                <a:spcPts val="0"/>
+              </a:spcAft>
+              <a:buSzPts val="1400"/>
+              <a:buNone/>
+              <a:defRPr/>
+            </a:lvl4pPr>
+            <a:lvl5pPr lvl="4" rtl="0" algn="l">
+              <a:lnSpc>
+                <a:spcPct val="100000"/>
+              </a:lnSpc>
+              <a:spcBef>
+                <a:spcPts val="0"/>
+              </a:spcBef>
+              <a:spcAft>
+                <a:spcPts val="0"/>
+              </a:spcAft>
+              <a:buSzPts val="1400"/>
+              <a:buNone/>
+              <a:defRPr/>
+            </a:lvl5pPr>
+            <a:lvl6pPr lvl="5" rtl="0" algn="l">
+              <a:lnSpc>
+                <a:spcPct val="100000"/>
+              </a:lnSpc>
+              <a:spcBef>
+                <a:spcPts val="0"/>
+              </a:spcBef>
+              <a:spcAft>
+                <a:spcPts val="0"/>
+              </a:spcAft>
+              <a:buSzPts val="1400"/>
+              <a:buNone/>
+              <a:defRPr/>
+            </a:lvl6pPr>
+            <a:lvl7pPr lvl="6" rtl="0" algn="l">
+              <a:lnSpc>
+                <a:spcPct val="100000"/>
+              </a:lnSpc>
+              <a:spcBef>
+                <a:spcPts val="0"/>
+              </a:spcBef>
+              <a:spcAft>
+                <a:spcPts val="0"/>
+              </a:spcAft>
+              <a:buSzPts val="1400"/>
+              <a:buNone/>
+              <a:defRPr/>
+            </a:lvl7pPr>
+            <a:lvl8pPr lvl="7" rtl="0" algn="l">
+              <a:lnSpc>
+                <a:spcPct val="100000"/>
+              </a:lnSpc>
+              <a:spcBef>
+                <a:spcPts val="0"/>
+              </a:spcBef>
+              <a:spcAft>
+                <a:spcPts val="0"/>
+              </a:spcAft>
+              <a:buSzPts val="1400"/>
+              <a:buNone/>
+              <a:defRPr/>
+            </a:lvl8pPr>
+            <a:lvl9pPr lvl="8" rtl="0" algn="l">
+              <a:lnSpc>
+                <a:spcPct val="100000"/>
+              </a:lnSpc>
+              <a:spcBef>
+                <a:spcPts val="0"/>
+              </a:spcBef>
+              <a:spcAft>
+                <a:spcPts val="0"/>
+              </a:spcAft>
+              <a:buSzPts val="1400"/>
+              <a:buNone/>
+              <a:defRPr/>
+            </a:lvl9pPr>
+          </a:lstStyle>
+          <a:p/>
+        </p:txBody>
+      </p:sp>
+      <p:sp>
+        <p:nvSpPr>
+          <p:cNvPr id="28" name="Google Shape;28;g6baf4b0859_0_6"/>
+          <p:cNvSpPr txBox="1"/>
+          <p:nvPr>
+            <p:ph idx="12" type="sldNum"/>
+          </p:nvPr>
+        </p:nvSpPr>
+        <p:spPr>
+          <a:xfrm>
+            <a:off x="6553200" y="6245225"/>
+            <a:ext cx="2133600" cy="476100"/>
+          </a:xfrm>
+          <a:prstGeom prst="rect">
+            <a:avLst/>
+          </a:prstGeom>
+          <a:noFill/>
+          <a:ln>
+            <a:noFill/>
+          </a:ln>
+        </p:spPr>
+        <p:txBody>
+          <a:bodyPr anchorCtr="0" anchor="t" bIns="45700" lIns="91425" spcFirstLastPara="1" rIns="91425" wrap="square" tIns="45700">
+            <a:noAutofit/>
+          </a:bodyPr>
+          <a:lstStyle>
+            <a:lvl1pPr indent="0" lvl="0" marL="0" marR="0" rtl="0" algn="r">
+              <a:lnSpc>
+                <a:spcPct val="100000"/>
+              </a:lnSpc>
+              <a:spcBef>
+                <a:spcPts val="0"/>
+              </a:spcBef>
+              <a:spcAft>
+                <a:spcPts val="0"/>
+              </a:spcAft>
+              <a:buClr>
+                <a:schemeClr val="dk1"/>
+              </a:buClr>
+              <a:buSzPts val="1400"/>
+              <a:buFont typeface="Arial"/>
+              <a:buNone/>
+              <a:defRPr b="0" i="0" sz="1400" u="none" cap="none" strike="noStrike">
+                <a:solidFill>
+                  <a:schemeClr val="dk1"/>
+                </a:solidFill>
+                <a:latin typeface="Arial"/>
+                <a:ea typeface="Arial"/>
+                <a:cs typeface="Arial"/>
+                <a:sym typeface="Arial"/>
+              </a:defRPr>
+            </a:lvl1pPr>
+            <a:lvl2pPr indent="0" lvl="1" marL="0" marR="0" rtl="0" algn="r">
+              <a:lnSpc>
+                <a:spcPct val="100000"/>
+              </a:lnSpc>
+              <a:spcBef>
+                <a:spcPts val="0"/>
+              </a:spcBef>
+              <a:spcAft>
+                <a:spcPts val="0"/>
+              </a:spcAft>
+              <a:buClr>
+                <a:schemeClr val="dk1"/>
+              </a:buClr>
+              <a:buSzPts val="1400"/>
+              <a:buFont typeface="Arial"/>
+              <a:buNone/>
+              <a:defRPr b="0" i="0" sz="1400" u="none" cap="none" strike="noStrike">
+                <a:solidFill>
+                  <a:schemeClr val="dk1"/>
+                </a:solidFill>
+                <a:latin typeface="Arial"/>
+                <a:ea typeface="Arial"/>
+                <a:cs typeface="Arial"/>
+                <a:sym typeface="Arial"/>
+              </a:defRPr>
+            </a:lvl2pPr>
+            <a:lvl3pPr indent="0" lvl="2" marL="0" marR="0" rtl="0" algn="r">
+              <a:lnSpc>
+                <a:spcPct val="100000"/>
+              </a:lnSpc>
+              <a:spcBef>
+                <a:spcPts val="0"/>
+              </a:spcBef>
+              <a:spcAft>
+                <a:spcPts val="0"/>
+              </a:spcAft>
+              <a:buClr>
+                <a:schemeClr val="dk1"/>
+              </a:buClr>
+              <a:buSzPts val="1400"/>
+              <a:buFont typeface="Arial"/>
+              <a:buNone/>
+              <a:defRPr b="0" i="0" sz="1400" u="none" cap="none" strike="noStrike">
+                <a:solidFill>
+                  <a:schemeClr val="dk1"/>
+                </a:solidFill>
+                <a:latin typeface="Arial"/>
+                <a:ea typeface="Arial"/>
+                <a:cs typeface="Arial"/>
+                <a:sym typeface="Arial"/>
+              </a:defRPr>
+            </a:lvl3pPr>
+            <a:lvl4pPr indent="0" lvl="3" marL="0" marR="0" rtl="0" algn="r">
+              <a:lnSpc>
+                <a:spcPct val="100000"/>
+              </a:lnSpc>
+              <a:spcBef>
+                <a:spcPts val="0"/>
+              </a:spcBef>
+              <a:spcAft>
+                <a:spcPts val="0"/>
+              </a:spcAft>
+              <a:buClr>
+                <a:schemeClr val="dk1"/>
+              </a:buClr>
+              <a:buSzPts val="1400"/>
+              <a:buFont typeface="Arial"/>
+              <a:buNone/>
+              <a:defRPr b="0" i="0" sz="1400" u="none" cap="none" strike="noStrike">
+                <a:solidFill>
+                  <a:schemeClr val="dk1"/>
+                </a:solidFill>
+                <a:latin typeface="Arial"/>
+                <a:ea typeface="Arial"/>
+                <a:cs typeface="Arial"/>
+                <a:sym typeface="Arial"/>
+              </a:defRPr>
+            </a:lvl4pPr>
+            <a:lvl5pPr indent="0" lvl="4" marL="0" marR="0" rtl="0" algn="r">
+              <a:lnSpc>
+                <a:spcPct val="100000"/>
+              </a:lnSpc>
+              <a:spcBef>
+                <a:spcPts val="0"/>
+              </a:spcBef>
+              <a:spcAft>
+                <a:spcPts val="0"/>
+              </a:spcAft>
+              <a:buClr>
+                <a:schemeClr val="dk1"/>
+              </a:buClr>
+              <a:buSzPts val="1400"/>
+              <a:buFont typeface="Arial"/>
+              <a:buNone/>
+              <a:defRPr b="0" i="0" sz="1400" u="none" cap="none" strike="noStrike">
+                <a:solidFill>
+                  <a:schemeClr val="dk1"/>
+                </a:solidFill>
+                <a:latin typeface="Arial"/>
+                <a:ea typeface="Arial"/>
+                <a:cs typeface="Arial"/>
+                <a:sym typeface="Arial"/>
+              </a:defRPr>
+            </a:lvl5pPr>
+            <a:lvl6pPr indent="0" lvl="5" marL="0" marR="0" rtl="0" algn="r">
+              <a:lnSpc>
+                <a:spcPct val="100000"/>
+              </a:lnSpc>
+              <a:spcBef>
+                <a:spcPts val="0"/>
+              </a:spcBef>
+              <a:spcAft>
+                <a:spcPts val="0"/>
+              </a:spcAft>
+              <a:buClr>
+                <a:schemeClr val="dk1"/>
+              </a:buClr>
+              <a:buSzPts val="1400"/>
+              <a:buFont typeface="Arial"/>
+              <a:buNone/>
+              <a:defRPr b="0" i="0" sz="1400" u="none" cap="none" strike="noStrike">
+                <a:solidFill>
+                  <a:schemeClr val="dk1"/>
+                </a:solidFill>
+                <a:latin typeface="Arial"/>
+                <a:ea typeface="Arial"/>
+                <a:cs typeface="Arial"/>
+                <a:sym typeface="Arial"/>
+              </a:defRPr>
+            </a:lvl6pPr>
+            <a:lvl7pPr indent="0" lvl="6" marL="0" marR="0" rtl="0" algn="r">
+              <a:lnSpc>
+                <a:spcPct val="100000"/>
+              </a:lnSpc>
+              <a:spcBef>
+                <a:spcPts val="0"/>
+              </a:spcBef>
+              <a:spcAft>
+                <a:spcPts val="0"/>
+              </a:spcAft>
+              <a:buClr>
+                <a:schemeClr val="dk1"/>
+              </a:buClr>
+              <a:buSzPts val="1400"/>
+              <a:buFont typeface="Arial"/>
+              <a:buNone/>
+              <a:defRPr b="0" i="0" sz="1400" u="none" cap="none" strike="noStrike">
+                <a:solidFill>
+                  <a:schemeClr val="dk1"/>
+                </a:solidFill>
+                <a:latin typeface="Arial"/>
+                <a:ea typeface="Arial"/>
+                <a:cs typeface="Arial"/>
+                <a:sym typeface="Arial"/>
+              </a:defRPr>
+            </a:lvl7pPr>
+            <a:lvl8pPr indent="0" lvl="7" marL="0" marR="0" rtl="0" algn="r">
+              <a:lnSpc>
+                <a:spcPct val="100000"/>
+              </a:lnSpc>
+              <a:spcBef>
+                <a:spcPts val="0"/>
+              </a:spcBef>
+              <a:spcAft>
+                <a:spcPts val="0"/>
+              </a:spcAft>
+              <a:buClr>
+                <a:schemeClr val="dk1"/>
+              </a:buClr>
+              <a:buSzPts val="1400"/>
+              <a:buFont typeface="Arial"/>
+              <a:buNone/>
+              <a:defRPr b="0" i="0" sz="1400" u="none" cap="none" strike="noStrike">
+                <a:solidFill>
+                  <a:schemeClr val="dk1"/>
+                </a:solidFill>
+                <a:latin typeface="Arial"/>
+                <a:ea typeface="Arial"/>
+                <a:cs typeface="Arial"/>
+                <a:sym typeface="Arial"/>
+              </a:defRPr>
+            </a:lvl8pPr>
+            <a:lvl9pPr indent="0" lvl="8" marL="0" marR="0" rtl="0" algn="r">
+              <a:lnSpc>
+                <a:spcPct val="100000"/>
+              </a:lnSpc>
+              <a:spcBef>
+                <a:spcPts val="0"/>
+              </a:spcBef>
+              <a:spcAft>
+                <a:spcPts val="0"/>
+              </a:spcAft>
+              <a:buClr>
+                <a:schemeClr val="dk1"/>
+              </a:buClr>
+              <a:buSzPts val="1400"/>
+              <a:buFont typeface="Arial"/>
+              <a:buNone/>
+              <a:defRPr b="0" i="0" sz="1400" u="none" cap="none" strike="noStrike">
+                <a:solidFill>
+                  <a:schemeClr val="dk1"/>
+                </a:solidFill>
+                <a:latin typeface="Arial"/>
+                <a:ea typeface="Arial"/>
+                <a:cs typeface="Arial"/>
+                <a:sym typeface="Arial"/>
+              </a:defRPr>
+            </a:lvl9pPr>
+          </a:lstStyle>
+          <a:p>
+            <a:pPr indent="0" lvl="0" marL="0" rtl="0" algn="r">
+              <a:spcBef>
+                <a:spcPts val="0"/>
+              </a:spcBef>
+              <a:spcAft>
+                <a:spcPts val="0"/>
+              </a:spcAft>
+              <a:buNone/>
+            </a:pPr>
+            <a:fld id="{00000000-1234-1234-1234-123412341234}" type="slidenum">
+              <a:rPr lang="en-US"/>
+              <a:t>‹#›</a:t>
+            </a:fld>
+            <a:endParaRPr/>
+          </a:p>
+        </p:txBody>
+      </p:sp>
+    </p:spTree>
+  </p:cSld>
+  <p:clrMapOvr>
+    <a:masterClrMapping/>
+  </p:clrMapOvr>
+</p:sldLayout>
+</file>
+
+<file path=ppt/slideLayouts/slideLayout4.xml><?xml version="1.0" encoding="utf-8"?>
+<p:sldLayout xmlns:a="http://schemas.openxmlformats.org/drawingml/2006/main" xmlns:r="http://schemas.openxmlformats.org/officeDocument/2006/relationships" xmlns:mc="http://schemas.openxmlformats.org/markup-compatibility/2006" xmlns:mv="urn:schemas-microsoft-com:mac:vml" xmlns:p="http://schemas.openxmlformats.org/presentationml/2006/main" xmlns:c="http://schemas.openxmlformats.org/drawingml/2006/chart" xmlns:dgm="http://schemas.openxmlformats.org/drawingml/2006/diagram" xmlns:o="urn:schemas-microsoft-com:office:office" xmlns:v="urn:schemas-microsoft-com:vml" xmlns:pvml="urn:schemas-microsoft-com:office:powerpoint" xmlns:com="http://schemas.openxmlformats.org/drawingml/2006/compatibility" xmlns:p14="http://schemas.microsoft.com/office/powerpoint/2010/main" xmlns:p15="http://schemas.microsoft.com/office/powerpoint/2012/main" matchingName="Dikey Başlık ve Metin" type="vertTitleAndTx">
+  <p:cSld name="VERTICAL_TITLE_AND_VERTICAL_TEXT">
+    <p:spTree>
+      <p:nvGrpSpPr>
+        <p:cNvPr id="29" name="Shape 29"/>
+        <p:cNvGrpSpPr/>
+        <p:nvPr/>
+      </p:nvGrpSpPr>
+      <p:grpSpPr>
+        <a:xfrm>
+          <a:off x="0" y="0"/>
+          <a:ext cx="0" cy="0"/>
+          <a:chOff x="0" y="0"/>
+          <a:chExt cx="0" cy="0"/>
+        </a:xfrm>
+      </p:grpSpPr>
+      <p:sp>
+        <p:nvSpPr>
+          <p:cNvPr id="30" name="Google Shape;30;p7"/>
           <p:cNvSpPr txBox="1"/>
           <p:nvPr>
             <p:ph type="title"/>
@@ -4806,7 +7167,7 @@
       </p:sp>
       <p:sp>
         <p:nvSpPr>
-          <p:cNvPr id="25" name="Google Shape;25;p7"/>
+          <p:cNvPr id="31" name="Google Shape;31;p7"/>
           <p:cNvSpPr txBox="1"/>
           <p:nvPr>
             <p:ph idx="1" type="body"/>
@@ -4962,7 +7323,7 @@
       </p:sp>
       <p:sp>
         <p:nvSpPr>
-          <p:cNvPr id="26" name="Google Shape;26;p7"/>
+          <p:cNvPr id="32" name="Google Shape;32;p7"/>
           <p:cNvSpPr txBox="1"/>
           <p:nvPr>
             <p:ph idx="10" type="dt"/>
@@ -5118,7 +7479,7 @@
       </p:sp>
       <p:sp>
         <p:nvSpPr>
-          <p:cNvPr id="27" name="Google Shape;27;p7"/>
+          <p:cNvPr id="33" name="Google Shape;33;p7"/>
           <p:cNvSpPr txBox="1"/>
           <p:nvPr>
             <p:ph idx="11" type="ftr"/>
@@ -5274,7 +7635,7 @@
       </p:sp>
       <p:sp>
         <p:nvSpPr>
-          <p:cNvPr id="28" name="Google Shape;28;p7"/>
+          <p:cNvPr id="34" name="Google Shape;34;p7"/>
           <p:cNvSpPr txBox="1"/>
           <p:nvPr>
             <p:ph idx="12" type="sldNum"/>
@@ -5559,12 +7920,12 @@
 </p:sldLayout>
 </file>
 
-<file path=ppt/slideLayouts/slideLayout4.xml><?xml version="1.0" encoding="utf-8"?>
+<file path=ppt/slideLayouts/slideLayout5.xml><?xml version="1.0" encoding="utf-8"?>
 <p:sldLayout xmlns:a="http://schemas.openxmlformats.org/drawingml/2006/main" xmlns:r="http://schemas.openxmlformats.org/officeDocument/2006/relationships" xmlns:mc="http://schemas.openxmlformats.org/markup-compatibility/2006" xmlns:mv="urn:schemas-microsoft-com:mac:vml" xmlns:p="http://schemas.openxmlformats.org/presentationml/2006/main" xmlns:c="http://schemas.openxmlformats.org/drawingml/2006/chart" xmlns:dgm="http://schemas.openxmlformats.org/drawingml/2006/diagram" xmlns:o="urn:schemas-microsoft-com:office:office" xmlns:v="urn:schemas-microsoft-com:vml" xmlns:pvml="urn:schemas-microsoft-com:office:powerpoint" xmlns:com="http://schemas.openxmlformats.org/drawingml/2006/compatibility" xmlns:p14="http://schemas.microsoft.com/office/powerpoint/2010/main" xmlns:p15="http://schemas.microsoft.com/office/powerpoint/2012/main" matchingName="Başlık, Dikey Metin" type="vertTx">
   <p:cSld name="VERTICAL_TEXT">
     <p:spTree>
       <p:nvGrpSpPr>
-        <p:cNvPr id="29" name="Shape 29"/>
+        <p:cNvPr id="35" name="Shape 35"/>
         <p:cNvGrpSpPr/>
         <p:nvPr/>
       </p:nvGrpSpPr>
@@ -5578,7 +7939,7 @@
       </p:grpSpPr>
       <p:sp>
         <p:nvSpPr>
-          <p:cNvPr id="30" name="Google Shape;30;p8"/>
+          <p:cNvPr id="36" name="Google Shape;36;p8"/>
           <p:cNvSpPr txBox="1"/>
           <p:nvPr>
             <p:ph type="title"/>
@@ -5707,7 +8068,7 @@
       </p:sp>
       <p:sp>
         <p:nvSpPr>
-          <p:cNvPr id="31" name="Google Shape;31;p8"/>
+          <p:cNvPr id="37" name="Google Shape;37;p8"/>
           <p:cNvSpPr txBox="1"/>
           <p:nvPr>
             <p:ph idx="1" type="body"/>
@@ -5863,7 +8224,7 @@
       </p:sp>
       <p:sp>
         <p:nvSpPr>
-          <p:cNvPr id="32" name="Google Shape;32;p8"/>
+          <p:cNvPr id="38" name="Google Shape;38;p8"/>
           <p:cNvSpPr txBox="1"/>
           <p:nvPr>
             <p:ph idx="10" type="dt"/>
@@ -6019,7 +8380,7 @@
       </p:sp>
       <p:sp>
         <p:nvSpPr>
-          <p:cNvPr id="33" name="Google Shape;33;p8"/>
+          <p:cNvPr id="39" name="Google Shape;39;p8"/>
           <p:cNvSpPr txBox="1"/>
           <p:nvPr>
             <p:ph idx="11" type="ftr"/>
@@ -6175,7 +8536,7 @@
       </p:sp>
       <p:sp>
         <p:nvSpPr>
-          <p:cNvPr id="34" name="Google Shape;34;p8"/>
+          <p:cNvPr id="40" name="Google Shape;40;p8"/>
           <p:cNvSpPr txBox="1"/>
           <p:nvPr>
             <p:ph idx="12" type="sldNum"/>
@@ -6460,12 +8821,12 @@
 </p:sldLayout>
 </file>
 
-<file path=ppt/slideLayouts/slideLayout5.xml><?xml version="1.0" encoding="utf-8"?>
+<file path=ppt/slideLayouts/slideLayout6.xml><?xml version="1.0" encoding="utf-8"?>
 <p:sldLayout xmlns:a="http://schemas.openxmlformats.org/drawingml/2006/main" xmlns:r="http://schemas.openxmlformats.org/officeDocument/2006/relationships" xmlns:mc="http://schemas.openxmlformats.org/markup-compatibility/2006" xmlns:mv="urn:schemas-microsoft-com:mac:vml" xmlns:p="http://schemas.openxmlformats.org/presentationml/2006/main" xmlns:c="http://schemas.openxmlformats.org/drawingml/2006/chart" xmlns:dgm="http://schemas.openxmlformats.org/drawingml/2006/diagram" xmlns:o="urn:schemas-microsoft-com:office:office" xmlns:v="urn:schemas-microsoft-com:vml" xmlns:pvml="urn:schemas-microsoft-com:office:powerpoint" xmlns:com="http://schemas.openxmlformats.org/drawingml/2006/compatibility" xmlns:p14="http://schemas.microsoft.com/office/powerpoint/2010/main" xmlns:p15="http://schemas.microsoft.com/office/powerpoint/2012/main" matchingName="Başlıklı Resim" type="picTx">
   <p:cSld name="PICTURE_WITH_CAPTION_TEXT">
     <p:spTree>
       <p:nvGrpSpPr>
-        <p:cNvPr id="35" name="Shape 35"/>
+        <p:cNvPr id="41" name="Shape 41"/>
         <p:cNvGrpSpPr/>
         <p:nvPr/>
       </p:nvGrpSpPr>
@@ -6479,7 +8840,7 @@
       </p:grpSpPr>
       <p:sp>
         <p:nvSpPr>
-          <p:cNvPr id="36" name="Google Shape;36;p9"/>
+          <p:cNvPr id="42" name="Google Shape;42;p9"/>
           <p:cNvSpPr txBox="1"/>
           <p:nvPr>
             <p:ph type="title"/>
@@ -6608,7 +8969,7 @@
       </p:sp>
       <p:sp>
         <p:nvSpPr>
-          <p:cNvPr id="37" name="Google Shape;37;p9"/>
+          <p:cNvPr id="43" name="Google Shape;43;p9"/>
           <p:cNvSpPr/>
           <p:nvPr>
             <p:ph idx="2" type="pic"/>
@@ -6845,7 +9206,7 @@
       </p:sp>
       <p:sp>
         <p:nvSpPr>
-          <p:cNvPr id="38" name="Google Shape;38;p9"/>
+          <p:cNvPr id="44" name="Google Shape;44;p9"/>
           <p:cNvSpPr txBox="1"/>
           <p:nvPr>
             <p:ph idx="1" type="body"/>
@@ -7010,7 +9371,7 @@
       </p:sp>
       <p:sp>
         <p:nvSpPr>
-          <p:cNvPr id="39" name="Google Shape;39;p9"/>
+          <p:cNvPr id="45" name="Google Shape;45;p9"/>
           <p:cNvSpPr txBox="1"/>
           <p:nvPr>
             <p:ph idx="10" type="dt"/>
@@ -7166,7 +9527,7 @@
       </p:sp>
       <p:sp>
         <p:nvSpPr>
-          <p:cNvPr id="40" name="Google Shape;40;p9"/>
+          <p:cNvPr id="46" name="Google Shape;46;p9"/>
           <p:cNvSpPr txBox="1"/>
           <p:nvPr>
             <p:ph idx="11" type="ftr"/>
@@ -7322,7 +9683,7 @@
       </p:sp>
       <p:sp>
         <p:nvSpPr>
-          <p:cNvPr id="41" name="Google Shape;41;p9"/>
+          <p:cNvPr id="47" name="Google Shape;47;p9"/>
           <p:cNvSpPr txBox="1"/>
           <p:nvPr>
             <p:ph idx="12" type="sldNum"/>
@@ -7607,12 +9968,12 @@
 </p:sldLayout>
 </file>
 
-<file path=ppt/slideLayouts/slideLayout6.xml><?xml version="1.0" encoding="utf-8"?>
+<file path=ppt/slideLayouts/slideLayout7.xml><?xml version="1.0" encoding="utf-8"?>
 <p:sldLayout xmlns:a="http://schemas.openxmlformats.org/drawingml/2006/main" xmlns:r="http://schemas.openxmlformats.org/officeDocument/2006/relationships" xmlns:mc="http://schemas.openxmlformats.org/markup-compatibility/2006" xmlns:mv="urn:schemas-microsoft-com:mac:vml" xmlns:p="http://schemas.openxmlformats.org/presentationml/2006/main" xmlns:c="http://schemas.openxmlformats.org/drawingml/2006/chart" xmlns:dgm="http://schemas.openxmlformats.org/drawingml/2006/diagram" xmlns:o="urn:schemas-microsoft-com:office:office" xmlns:v="urn:schemas-microsoft-com:vml" xmlns:pvml="urn:schemas-microsoft-com:office:powerpoint" xmlns:com="http://schemas.openxmlformats.org/drawingml/2006/compatibility" xmlns:p14="http://schemas.microsoft.com/office/powerpoint/2010/main" xmlns:p15="http://schemas.microsoft.com/office/powerpoint/2012/main" matchingName="Başlıklı İçerik" type="objTx">
   <p:cSld name="OBJECT_WITH_CAPTION_TEXT">
     <p:spTree>
       <p:nvGrpSpPr>
-        <p:cNvPr id="42" name="Shape 42"/>
+        <p:cNvPr id="48" name="Shape 48"/>
         <p:cNvGrpSpPr/>
         <p:nvPr/>
       </p:nvGrpSpPr>
@@ -7626,7 +9987,7 @@
       </p:grpSpPr>
       <p:sp>
         <p:nvSpPr>
-          <p:cNvPr id="43" name="Google Shape;43;p10"/>
+          <p:cNvPr id="49" name="Google Shape;49;p10"/>
           <p:cNvSpPr txBox="1"/>
           <p:nvPr>
             <p:ph type="title"/>
@@ -7755,7 +10116,7 @@
       </p:sp>
       <p:sp>
         <p:nvSpPr>
-          <p:cNvPr id="44" name="Google Shape;44;p10"/>
+          <p:cNvPr id="50" name="Google Shape;50;p10"/>
           <p:cNvSpPr txBox="1"/>
           <p:nvPr>
             <p:ph idx="1" type="body"/>
@@ -7920,7 +10281,7 @@
       </p:sp>
       <p:sp>
         <p:nvSpPr>
-          <p:cNvPr id="45" name="Google Shape;45;p10"/>
+          <p:cNvPr id="51" name="Google Shape;51;p10"/>
           <p:cNvSpPr txBox="1"/>
           <p:nvPr>
             <p:ph idx="2" type="body"/>
@@ -8085,7 +10446,7 @@
       </p:sp>
       <p:sp>
         <p:nvSpPr>
-          <p:cNvPr id="46" name="Google Shape;46;p10"/>
+          <p:cNvPr id="52" name="Google Shape;52;p10"/>
           <p:cNvSpPr txBox="1"/>
           <p:nvPr>
             <p:ph idx="10" type="dt"/>
@@ -8241,7 +10602,7 @@
       </p:sp>
       <p:sp>
         <p:nvSpPr>
-          <p:cNvPr id="47" name="Google Shape;47;p10"/>
+          <p:cNvPr id="53" name="Google Shape;53;p10"/>
           <p:cNvSpPr txBox="1"/>
           <p:nvPr>
             <p:ph idx="11" type="ftr"/>
@@ -8397,7 +10758,7 @@
       </p:sp>
       <p:sp>
         <p:nvSpPr>
-          <p:cNvPr id="48" name="Google Shape;48;p10"/>
+          <p:cNvPr id="54" name="Google Shape;54;p10"/>
           <p:cNvSpPr txBox="1"/>
           <p:nvPr>
             <p:ph idx="12" type="sldNum"/>
@@ -8682,12 +11043,12 @@
 </p:sldLayout>
 </file>
 
-<file path=ppt/slideLayouts/slideLayout7.xml><?xml version="1.0" encoding="utf-8"?>
+<file path=ppt/slideLayouts/slideLayout8.xml><?xml version="1.0" encoding="utf-8"?>
 <p:sldLayout xmlns:a="http://schemas.openxmlformats.org/drawingml/2006/main" xmlns:r="http://schemas.openxmlformats.org/officeDocument/2006/relationships" xmlns:mc="http://schemas.openxmlformats.org/markup-compatibility/2006" xmlns:mv="urn:schemas-microsoft-com:mac:vml" xmlns:p="http://schemas.openxmlformats.org/presentationml/2006/main" xmlns:c="http://schemas.openxmlformats.org/drawingml/2006/chart" xmlns:dgm="http://schemas.openxmlformats.org/drawingml/2006/diagram" xmlns:o="urn:schemas-microsoft-com:office:office" xmlns:v="urn:schemas-microsoft-com:vml" xmlns:pvml="urn:schemas-microsoft-com:office:powerpoint" xmlns:com="http://schemas.openxmlformats.org/drawingml/2006/compatibility" xmlns:p14="http://schemas.microsoft.com/office/powerpoint/2010/main" xmlns:p15="http://schemas.microsoft.com/office/powerpoint/2012/main" matchingName="Boş" type="blank">
   <p:cSld name="BLANK">
     <p:spTree>
       <p:nvGrpSpPr>
-        <p:cNvPr id="49" name="Shape 49"/>
+        <p:cNvPr id="55" name="Shape 55"/>
         <p:cNvGrpSpPr/>
         <p:nvPr/>
       </p:nvGrpSpPr>
@@ -8701,7 +11062,7 @@
       </p:grpSpPr>
       <p:sp>
         <p:nvSpPr>
-          <p:cNvPr id="50" name="Google Shape;50;p11"/>
+          <p:cNvPr id="56" name="Google Shape;56;p11"/>
           <p:cNvSpPr txBox="1"/>
           <p:nvPr>
             <p:ph idx="10" type="dt"/>
@@ -8857,7 +11218,7 @@
       </p:sp>
       <p:sp>
         <p:nvSpPr>
-          <p:cNvPr id="51" name="Google Shape;51;p11"/>
+          <p:cNvPr id="57" name="Google Shape;57;p11"/>
           <p:cNvSpPr txBox="1"/>
           <p:nvPr>
             <p:ph idx="11" type="ftr"/>
@@ -9013,7 +11374,7 @@
       </p:sp>
       <p:sp>
         <p:nvSpPr>
-          <p:cNvPr id="52" name="Google Shape;52;p11"/>
+          <p:cNvPr id="58" name="Google Shape;58;p11"/>
           <p:cNvSpPr txBox="1"/>
           <p:nvPr>
             <p:ph idx="12" type="sldNum"/>
@@ -9298,12 +11659,12 @@
 </p:sldLayout>
 </file>
 
-<file path=ppt/slideLayouts/slideLayout8.xml><?xml version="1.0" encoding="utf-8"?>
+<file path=ppt/slideLayouts/slideLayout9.xml><?xml version="1.0" encoding="utf-8"?>
 <p:sldLayout xmlns:a="http://schemas.openxmlformats.org/drawingml/2006/main" xmlns:r="http://schemas.openxmlformats.org/officeDocument/2006/relationships" xmlns:mc="http://schemas.openxmlformats.org/markup-compatibility/2006" xmlns:mv="urn:schemas-microsoft-com:mac:vml" xmlns:p="http://schemas.openxmlformats.org/presentationml/2006/main" xmlns:c="http://schemas.openxmlformats.org/drawingml/2006/chart" xmlns:dgm="http://schemas.openxmlformats.org/drawingml/2006/diagram" xmlns:o="urn:schemas-microsoft-com:office:office" xmlns:v="urn:schemas-microsoft-com:vml" xmlns:pvml="urn:schemas-microsoft-com:office:powerpoint" xmlns:com="http://schemas.openxmlformats.org/drawingml/2006/compatibility" xmlns:p14="http://schemas.microsoft.com/office/powerpoint/2010/main" xmlns:p15="http://schemas.microsoft.com/office/powerpoint/2012/main" matchingName="Yalnızca Başlık" type="titleOnly">
   <p:cSld name="TITLE_ONLY">
     <p:spTree>
       <p:nvGrpSpPr>
-        <p:cNvPr id="53" name="Shape 53"/>
+        <p:cNvPr id="59" name="Shape 59"/>
         <p:cNvGrpSpPr/>
         <p:nvPr/>
       </p:nvGrpSpPr>
@@ -9317,7 +11678,7 @@
       </p:grpSpPr>
       <p:sp>
         <p:nvSpPr>
-          <p:cNvPr id="54" name="Google Shape;54;p12"/>
+          <p:cNvPr id="60" name="Google Shape;60;p12"/>
           <p:cNvSpPr txBox="1"/>
           <p:nvPr>
             <p:ph type="title"/>
@@ -9446,7 +11807,7 @@
       </p:sp>
       <p:sp>
         <p:nvSpPr>
-          <p:cNvPr id="55" name="Google Shape;55;p12"/>
+          <p:cNvPr id="61" name="Google Shape;61;p12"/>
           <p:cNvSpPr txBox="1"/>
           <p:nvPr>
             <p:ph idx="10" type="dt"/>
@@ -9602,7 +11963,7 @@
       </p:sp>
       <p:sp>
         <p:nvSpPr>
-          <p:cNvPr id="56" name="Google Shape;56;p12"/>
+          <p:cNvPr id="62" name="Google Shape;62;p12"/>
           <p:cNvSpPr txBox="1"/>
           <p:nvPr>
             <p:ph idx="11" type="ftr"/>
@@ -9758,1412 +12119,7 @@
       </p:sp>
       <p:sp>
         <p:nvSpPr>
-          <p:cNvPr id="57" name="Google Shape;57;p12"/>
-          <p:cNvSpPr txBox="1"/>
-          <p:nvPr>
-            <p:ph idx="12" type="sldNum"/>
-          </p:nvPr>
-        </p:nvSpPr>
-        <p:spPr>
-          <a:xfrm>
-            <a:off x="6553200" y="6245225"/>
-            <a:ext cx="2133600" cy="476100"/>
-          </a:xfrm>
-          <a:prstGeom prst="rect">
-            <a:avLst/>
-          </a:prstGeom>
-          <a:noFill/>
-          <a:ln>
-            <a:noFill/>
-          </a:ln>
-        </p:spPr>
-        <p:txBody>
-          <a:bodyPr anchorCtr="0" anchor="t" bIns="45700" lIns="91425" spcFirstLastPara="1" rIns="91425" wrap="square" tIns="45700">
-            <a:noAutofit/>
-          </a:bodyPr>
-          <a:lstStyle>
-            <a:lvl1pPr indent="0" lvl="0" marL="0" marR="0" rtl="0" algn="r">
-              <a:lnSpc>
-                <a:spcPct val="100000"/>
-              </a:lnSpc>
-              <a:spcBef>
-                <a:spcPts val="0"/>
-              </a:spcBef>
-              <a:spcAft>
-                <a:spcPts val="0"/>
-              </a:spcAft>
-              <a:buClr>
-                <a:schemeClr val="dk1"/>
-              </a:buClr>
-              <a:buSzPts val="1400"/>
-              <a:buFont typeface="Arial"/>
-              <a:buNone/>
-              <a:defRPr b="0" i="0" sz="1400" u="none" cap="none" strike="noStrike">
-                <a:solidFill>
-                  <a:schemeClr val="dk1"/>
-                </a:solidFill>
-                <a:latin typeface="Arial"/>
-                <a:ea typeface="Arial"/>
-                <a:cs typeface="Arial"/>
-                <a:sym typeface="Arial"/>
-              </a:defRPr>
-            </a:lvl1pPr>
-            <a:lvl2pPr indent="0" lvl="1" marL="0" marR="0" rtl="0" algn="r">
-              <a:lnSpc>
-                <a:spcPct val="100000"/>
-              </a:lnSpc>
-              <a:spcBef>
-                <a:spcPts val="0"/>
-              </a:spcBef>
-              <a:spcAft>
-                <a:spcPts val="0"/>
-              </a:spcAft>
-              <a:buClr>
-                <a:schemeClr val="dk1"/>
-              </a:buClr>
-              <a:buSzPts val="1400"/>
-              <a:buFont typeface="Arial"/>
-              <a:buNone/>
-              <a:defRPr b="0" i="0" sz="1400" u="none" cap="none" strike="noStrike">
-                <a:solidFill>
-                  <a:schemeClr val="dk1"/>
-                </a:solidFill>
-                <a:latin typeface="Arial"/>
-                <a:ea typeface="Arial"/>
-                <a:cs typeface="Arial"/>
-                <a:sym typeface="Arial"/>
-              </a:defRPr>
-            </a:lvl2pPr>
-            <a:lvl3pPr indent="0" lvl="2" marL="0" marR="0" rtl="0" algn="r">
-              <a:lnSpc>
-                <a:spcPct val="100000"/>
-              </a:lnSpc>
-              <a:spcBef>
-                <a:spcPts val="0"/>
-              </a:spcBef>
-              <a:spcAft>
-                <a:spcPts val="0"/>
-              </a:spcAft>
-              <a:buClr>
-                <a:schemeClr val="dk1"/>
-              </a:buClr>
-              <a:buSzPts val="1400"/>
-              <a:buFont typeface="Arial"/>
-              <a:buNone/>
-              <a:defRPr b="0" i="0" sz="1400" u="none" cap="none" strike="noStrike">
-                <a:solidFill>
-                  <a:schemeClr val="dk1"/>
-                </a:solidFill>
-                <a:latin typeface="Arial"/>
-                <a:ea typeface="Arial"/>
-                <a:cs typeface="Arial"/>
-                <a:sym typeface="Arial"/>
-              </a:defRPr>
-            </a:lvl3pPr>
-            <a:lvl4pPr indent="0" lvl="3" marL="0" marR="0" rtl="0" algn="r">
-              <a:lnSpc>
-                <a:spcPct val="100000"/>
-              </a:lnSpc>
-              <a:spcBef>
-                <a:spcPts val="0"/>
-              </a:spcBef>
-              <a:spcAft>
-                <a:spcPts val="0"/>
-              </a:spcAft>
-              <a:buClr>
-                <a:schemeClr val="dk1"/>
-              </a:buClr>
-              <a:buSzPts val="1400"/>
-              <a:buFont typeface="Arial"/>
-              <a:buNone/>
-              <a:defRPr b="0" i="0" sz="1400" u="none" cap="none" strike="noStrike">
-                <a:solidFill>
-                  <a:schemeClr val="dk1"/>
-                </a:solidFill>
-                <a:latin typeface="Arial"/>
-                <a:ea typeface="Arial"/>
-                <a:cs typeface="Arial"/>
-                <a:sym typeface="Arial"/>
-              </a:defRPr>
-            </a:lvl4pPr>
-            <a:lvl5pPr indent="0" lvl="4" marL="0" marR="0" rtl="0" algn="r">
-              <a:lnSpc>
-                <a:spcPct val="100000"/>
-              </a:lnSpc>
-              <a:spcBef>
-                <a:spcPts val="0"/>
-              </a:spcBef>
-              <a:spcAft>
-                <a:spcPts val="0"/>
-              </a:spcAft>
-              <a:buClr>
-                <a:schemeClr val="dk1"/>
-              </a:buClr>
-              <a:buSzPts val="1400"/>
-              <a:buFont typeface="Arial"/>
-              <a:buNone/>
-              <a:defRPr b="0" i="0" sz="1400" u="none" cap="none" strike="noStrike">
-                <a:solidFill>
-                  <a:schemeClr val="dk1"/>
-                </a:solidFill>
-                <a:latin typeface="Arial"/>
-                <a:ea typeface="Arial"/>
-                <a:cs typeface="Arial"/>
-                <a:sym typeface="Arial"/>
-              </a:defRPr>
-            </a:lvl5pPr>
-            <a:lvl6pPr indent="0" lvl="5" marL="0" marR="0" rtl="0" algn="r">
-              <a:lnSpc>
-                <a:spcPct val="100000"/>
-              </a:lnSpc>
-              <a:spcBef>
-                <a:spcPts val="0"/>
-              </a:spcBef>
-              <a:spcAft>
-                <a:spcPts val="0"/>
-              </a:spcAft>
-              <a:buClr>
-                <a:schemeClr val="dk1"/>
-              </a:buClr>
-              <a:buSzPts val="1400"/>
-              <a:buFont typeface="Arial"/>
-              <a:buNone/>
-              <a:defRPr b="0" i="0" sz="1400" u="none" cap="none" strike="noStrike">
-                <a:solidFill>
-                  <a:schemeClr val="dk1"/>
-                </a:solidFill>
-                <a:latin typeface="Arial"/>
-                <a:ea typeface="Arial"/>
-                <a:cs typeface="Arial"/>
-                <a:sym typeface="Arial"/>
-              </a:defRPr>
-            </a:lvl6pPr>
-            <a:lvl7pPr indent="0" lvl="6" marL="0" marR="0" rtl="0" algn="r">
-              <a:lnSpc>
-                <a:spcPct val="100000"/>
-              </a:lnSpc>
-              <a:spcBef>
-                <a:spcPts val="0"/>
-              </a:spcBef>
-              <a:spcAft>
-                <a:spcPts val="0"/>
-              </a:spcAft>
-              <a:buClr>
-                <a:schemeClr val="dk1"/>
-              </a:buClr>
-              <a:buSzPts val="1400"/>
-              <a:buFont typeface="Arial"/>
-              <a:buNone/>
-              <a:defRPr b="0" i="0" sz="1400" u="none" cap="none" strike="noStrike">
-                <a:solidFill>
-                  <a:schemeClr val="dk1"/>
-                </a:solidFill>
-                <a:latin typeface="Arial"/>
-                <a:ea typeface="Arial"/>
-                <a:cs typeface="Arial"/>
-                <a:sym typeface="Arial"/>
-              </a:defRPr>
-            </a:lvl7pPr>
-            <a:lvl8pPr indent="0" lvl="7" marL="0" marR="0" rtl="0" algn="r">
-              <a:lnSpc>
-                <a:spcPct val="100000"/>
-              </a:lnSpc>
-              <a:spcBef>
-                <a:spcPts val="0"/>
-              </a:spcBef>
-              <a:spcAft>
-                <a:spcPts val="0"/>
-              </a:spcAft>
-              <a:buClr>
-                <a:schemeClr val="dk1"/>
-              </a:buClr>
-              <a:buSzPts val="1400"/>
-              <a:buFont typeface="Arial"/>
-              <a:buNone/>
-              <a:defRPr b="0" i="0" sz="1400" u="none" cap="none" strike="noStrike">
-                <a:solidFill>
-                  <a:schemeClr val="dk1"/>
-                </a:solidFill>
-                <a:latin typeface="Arial"/>
-                <a:ea typeface="Arial"/>
-                <a:cs typeface="Arial"/>
-                <a:sym typeface="Arial"/>
-              </a:defRPr>
-            </a:lvl8pPr>
-            <a:lvl9pPr indent="0" lvl="8" marL="0" marR="0" rtl="0" algn="r">
-              <a:lnSpc>
-                <a:spcPct val="100000"/>
-              </a:lnSpc>
-              <a:spcBef>
-                <a:spcPts val="0"/>
-              </a:spcBef>
-              <a:spcAft>
-                <a:spcPts val="0"/>
-              </a:spcAft>
-              <a:buClr>
-                <a:schemeClr val="dk1"/>
-              </a:buClr>
-              <a:buSzPts val="1400"/>
-              <a:buFont typeface="Arial"/>
-              <a:buNone/>
-              <a:defRPr b="0" i="0" sz="1400" u="none" cap="none" strike="noStrike">
-                <a:solidFill>
-                  <a:schemeClr val="dk1"/>
-                </a:solidFill>
-                <a:latin typeface="Arial"/>
-                <a:ea typeface="Arial"/>
-                <a:cs typeface="Arial"/>
-                <a:sym typeface="Arial"/>
-              </a:defRPr>
-            </a:lvl9pPr>
-          </a:lstStyle>
-          <a:p>
-            <a:pPr indent="0" lvl="0" marL="0" rtl="0" algn="r">
-              <a:spcBef>
-                <a:spcPts val="0"/>
-              </a:spcBef>
-              <a:spcAft>
-                <a:spcPts val="0"/>
-              </a:spcAft>
-              <a:buNone/>
-            </a:pPr>
-            <a:fld id="{00000000-1234-1234-1234-123412341234}" type="slidenum">
-              <a:rPr lang="en-US"/>
-              <a:t>‹#›</a:t>
-            </a:fld>
-            <a:endParaRPr/>
-          </a:p>
-        </p:txBody>
-      </p:sp>
-    </p:spTree>
-  </p:cSld>
-  <p:clrMapOvr>
-    <a:masterClrMapping/>
-  </p:clrMapOvr>
-</p:sldLayout>
-</file>
-
-<file path=ppt/slideLayouts/slideLayout9.xml><?xml version="1.0" encoding="utf-8"?>
-<p:sldLayout xmlns:a="http://schemas.openxmlformats.org/drawingml/2006/main" xmlns:r="http://schemas.openxmlformats.org/officeDocument/2006/relationships" xmlns:mc="http://schemas.openxmlformats.org/markup-compatibility/2006" xmlns:mv="urn:schemas-microsoft-com:mac:vml" xmlns:p="http://schemas.openxmlformats.org/presentationml/2006/main" xmlns:c="http://schemas.openxmlformats.org/drawingml/2006/chart" xmlns:dgm="http://schemas.openxmlformats.org/drawingml/2006/diagram" xmlns:o="urn:schemas-microsoft-com:office:office" xmlns:v="urn:schemas-microsoft-com:vml" xmlns:pvml="urn:schemas-microsoft-com:office:powerpoint" xmlns:com="http://schemas.openxmlformats.org/drawingml/2006/compatibility" xmlns:p14="http://schemas.microsoft.com/office/powerpoint/2010/main" xmlns:p15="http://schemas.microsoft.com/office/powerpoint/2012/main" matchingName="Karşılaştırma" type="twoTxTwoObj">
-  <p:cSld name="TWO_OBJECTS_WITH_TEXT">
-    <p:spTree>
-      <p:nvGrpSpPr>
-        <p:cNvPr id="58" name="Shape 58"/>
-        <p:cNvGrpSpPr/>
-        <p:nvPr/>
-      </p:nvGrpSpPr>
-      <p:grpSpPr>
-        <a:xfrm>
-          <a:off x="0" y="0"/>
-          <a:ext cx="0" cy="0"/>
-          <a:chOff x="0" y="0"/>
-          <a:chExt cx="0" cy="0"/>
-        </a:xfrm>
-      </p:grpSpPr>
-      <p:sp>
-        <p:nvSpPr>
-          <p:cNvPr id="59" name="Google Shape;59;p13"/>
-          <p:cNvSpPr txBox="1"/>
-          <p:nvPr>
-            <p:ph type="title"/>
-          </p:nvPr>
-        </p:nvSpPr>
-        <p:spPr>
-          <a:xfrm>
-            <a:off x="457200" y="274637"/>
-            <a:ext cx="8229600" cy="1143000"/>
-          </a:xfrm>
-          <a:prstGeom prst="rect">
-            <a:avLst/>
-          </a:prstGeom>
-          <a:noFill/>
-          <a:ln>
-            <a:noFill/>
-          </a:ln>
-        </p:spPr>
-        <p:txBody>
-          <a:bodyPr anchorCtr="0" anchor="ctr" bIns="45700" lIns="91425" spcFirstLastPara="1" rIns="91425" wrap="square" tIns="45700">
-            <a:noAutofit/>
-          </a:bodyPr>
-          <a:lstStyle>
-            <a:lvl1pPr lvl="0" rtl="0" algn="ctr">
-              <a:spcBef>
-                <a:spcPts val="0"/>
-              </a:spcBef>
-              <a:spcAft>
-                <a:spcPts val="0"/>
-              </a:spcAft>
-              <a:buSzPts val="1400"/>
-              <a:buNone/>
-              <a:defRPr/>
-            </a:lvl1pPr>
-            <a:lvl2pPr lvl="1" rtl="0" algn="ctr">
-              <a:spcBef>
-                <a:spcPts val="0"/>
-              </a:spcBef>
-              <a:spcAft>
-                <a:spcPts val="0"/>
-              </a:spcAft>
-              <a:buSzPts val="1400"/>
-              <a:buNone/>
-              <a:defRPr/>
-            </a:lvl2pPr>
-            <a:lvl3pPr lvl="2" rtl="0" algn="ctr">
-              <a:spcBef>
-                <a:spcPts val="0"/>
-              </a:spcBef>
-              <a:spcAft>
-                <a:spcPts val="0"/>
-              </a:spcAft>
-              <a:buSzPts val="1400"/>
-              <a:buNone/>
-              <a:defRPr/>
-            </a:lvl3pPr>
-            <a:lvl4pPr lvl="3" rtl="0" algn="ctr">
-              <a:spcBef>
-                <a:spcPts val="0"/>
-              </a:spcBef>
-              <a:spcAft>
-                <a:spcPts val="0"/>
-              </a:spcAft>
-              <a:buSzPts val="1400"/>
-              <a:buNone/>
-              <a:defRPr/>
-            </a:lvl4pPr>
-            <a:lvl5pPr lvl="4" rtl="0" algn="ctr">
-              <a:spcBef>
-                <a:spcPts val="0"/>
-              </a:spcBef>
-              <a:spcAft>
-                <a:spcPts val="0"/>
-              </a:spcAft>
-              <a:buSzPts val="1400"/>
-              <a:buNone/>
-              <a:defRPr/>
-            </a:lvl5pPr>
-            <a:lvl6pPr lvl="5" rtl="0" algn="ctr">
-              <a:spcBef>
-                <a:spcPts val="0"/>
-              </a:spcBef>
-              <a:spcAft>
-                <a:spcPts val="0"/>
-              </a:spcAft>
-              <a:buSzPts val="1400"/>
-              <a:buNone/>
-              <a:defRPr/>
-            </a:lvl6pPr>
-            <a:lvl7pPr lvl="6" rtl="0" algn="ctr">
-              <a:spcBef>
-                <a:spcPts val="0"/>
-              </a:spcBef>
-              <a:spcAft>
-                <a:spcPts val="0"/>
-              </a:spcAft>
-              <a:buSzPts val="1400"/>
-              <a:buNone/>
-              <a:defRPr/>
-            </a:lvl7pPr>
-            <a:lvl8pPr lvl="7" rtl="0" algn="ctr">
-              <a:spcBef>
-                <a:spcPts val="0"/>
-              </a:spcBef>
-              <a:spcAft>
-                <a:spcPts val="0"/>
-              </a:spcAft>
-              <a:buSzPts val="1400"/>
-              <a:buNone/>
-              <a:defRPr/>
-            </a:lvl8pPr>
-            <a:lvl9pPr lvl="8" rtl="0" algn="ctr">
-              <a:spcBef>
-                <a:spcPts val="0"/>
-              </a:spcBef>
-              <a:spcAft>
-                <a:spcPts val="0"/>
-              </a:spcAft>
-              <a:buSzPts val="1400"/>
-              <a:buNone/>
-              <a:defRPr/>
-            </a:lvl9pPr>
-          </a:lstStyle>
-          <a:p/>
-        </p:txBody>
-      </p:sp>
-      <p:sp>
-        <p:nvSpPr>
-          <p:cNvPr id="60" name="Google Shape;60;p13"/>
-          <p:cNvSpPr txBox="1"/>
-          <p:nvPr>
-            <p:ph idx="1" type="body"/>
-          </p:nvPr>
-        </p:nvSpPr>
-        <p:spPr>
-          <a:xfrm>
-            <a:off x="457200" y="1535113"/>
-            <a:ext cx="4040100" cy="639900"/>
-          </a:xfrm>
-          <a:prstGeom prst="rect">
-            <a:avLst/>
-          </a:prstGeom>
-          <a:noFill/>
-          <a:ln>
-            <a:noFill/>
-          </a:ln>
-        </p:spPr>
-        <p:txBody>
-          <a:bodyPr anchorCtr="0" anchor="b" bIns="45700" lIns="91425" spcFirstLastPara="1" rIns="91425" wrap="square" tIns="45700">
-            <a:noAutofit/>
-          </a:bodyPr>
-          <a:lstStyle>
-            <a:lvl1pPr indent="-228600" lvl="0" marL="457200" rtl="0" algn="l">
-              <a:spcBef>
-                <a:spcPts val="480"/>
-              </a:spcBef>
-              <a:spcAft>
-                <a:spcPts val="0"/>
-              </a:spcAft>
-              <a:buClr>
-                <a:schemeClr val="dk1"/>
-              </a:buClr>
-              <a:buSzPts val="2400"/>
-              <a:buFont typeface="Arial"/>
-              <a:buNone/>
-              <a:defRPr b="1" sz="2400"/>
-            </a:lvl1pPr>
-            <a:lvl2pPr indent="-228600" lvl="1" marL="914400" rtl="0" algn="l">
-              <a:spcBef>
-                <a:spcPts val="400"/>
-              </a:spcBef>
-              <a:spcAft>
-                <a:spcPts val="0"/>
-              </a:spcAft>
-              <a:buClr>
-                <a:schemeClr val="dk1"/>
-              </a:buClr>
-              <a:buSzPts val="2000"/>
-              <a:buFont typeface="Arial"/>
-              <a:buNone/>
-              <a:defRPr b="1" sz="2000"/>
-            </a:lvl2pPr>
-            <a:lvl3pPr indent="-228600" lvl="2" marL="1371600" rtl="0" algn="l">
-              <a:spcBef>
-                <a:spcPts val="360"/>
-              </a:spcBef>
-              <a:spcAft>
-                <a:spcPts val="0"/>
-              </a:spcAft>
-              <a:buClr>
-                <a:schemeClr val="dk1"/>
-              </a:buClr>
-              <a:buSzPts val="1800"/>
-              <a:buFont typeface="Arial"/>
-              <a:buNone/>
-              <a:defRPr b="1" sz="1800"/>
-            </a:lvl3pPr>
-            <a:lvl4pPr indent="-228600" lvl="3" marL="1828800" rtl="0" algn="l">
-              <a:spcBef>
-                <a:spcPts val="320"/>
-              </a:spcBef>
-              <a:spcAft>
-                <a:spcPts val="0"/>
-              </a:spcAft>
-              <a:buClr>
-                <a:schemeClr val="dk1"/>
-              </a:buClr>
-              <a:buSzPts val="1600"/>
-              <a:buFont typeface="Arial"/>
-              <a:buNone/>
-              <a:defRPr b="1" sz="1600"/>
-            </a:lvl4pPr>
-            <a:lvl5pPr indent="-228600" lvl="4" marL="2286000" rtl="0" algn="l">
-              <a:spcBef>
-                <a:spcPts val="320"/>
-              </a:spcBef>
-              <a:spcAft>
-                <a:spcPts val="0"/>
-              </a:spcAft>
-              <a:buClr>
-                <a:schemeClr val="dk1"/>
-              </a:buClr>
-              <a:buSzPts val="1600"/>
-              <a:buFont typeface="Arial"/>
-              <a:buNone/>
-              <a:defRPr b="1" sz="1600"/>
-            </a:lvl5pPr>
-            <a:lvl6pPr indent="-228600" lvl="5" marL="2743200" rtl="0" algn="l">
-              <a:spcBef>
-                <a:spcPts val="320"/>
-              </a:spcBef>
-              <a:spcAft>
-                <a:spcPts val="0"/>
-              </a:spcAft>
-              <a:buClr>
-                <a:schemeClr val="dk1"/>
-              </a:buClr>
-              <a:buSzPts val="1600"/>
-              <a:buFont typeface="Arial"/>
-              <a:buNone/>
-              <a:defRPr b="1" sz="1600"/>
-            </a:lvl6pPr>
-            <a:lvl7pPr indent="-228600" lvl="6" marL="3200400" rtl="0" algn="l">
-              <a:spcBef>
-                <a:spcPts val="320"/>
-              </a:spcBef>
-              <a:spcAft>
-                <a:spcPts val="0"/>
-              </a:spcAft>
-              <a:buClr>
-                <a:schemeClr val="dk1"/>
-              </a:buClr>
-              <a:buSzPts val="1600"/>
-              <a:buFont typeface="Arial"/>
-              <a:buNone/>
-              <a:defRPr b="1" sz="1600"/>
-            </a:lvl7pPr>
-            <a:lvl8pPr indent="-228600" lvl="7" marL="3657600" rtl="0" algn="l">
-              <a:spcBef>
-                <a:spcPts val="320"/>
-              </a:spcBef>
-              <a:spcAft>
-                <a:spcPts val="0"/>
-              </a:spcAft>
-              <a:buClr>
-                <a:schemeClr val="dk1"/>
-              </a:buClr>
-              <a:buSzPts val="1600"/>
-              <a:buFont typeface="Arial"/>
-              <a:buNone/>
-              <a:defRPr b="1" sz="1600"/>
-            </a:lvl8pPr>
-            <a:lvl9pPr indent="-228600" lvl="8" marL="4114800" rtl="0" algn="l">
-              <a:spcBef>
-                <a:spcPts val="320"/>
-              </a:spcBef>
-              <a:spcAft>
-                <a:spcPts val="0"/>
-              </a:spcAft>
-              <a:buClr>
-                <a:schemeClr val="dk1"/>
-              </a:buClr>
-              <a:buSzPts val="1600"/>
-              <a:buFont typeface="Arial"/>
-              <a:buNone/>
-              <a:defRPr b="1" sz="1600"/>
-            </a:lvl9pPr>
-          </a:lstStyle>
-          <a:p/>
-        </p:txBody>
-      </p:sp>
-      <p:sp>
-        <p:nvSpPr>
-          <p:cNvPr id="61" name="Google Shape;61;p13"/>
-          <p:cNvSpPr txBox="1"/>
-          <p:nvPr>
-            <p:ph idx="2" type="body"/>
-          </p:nvPr>
-        </p:nvSpPr>
-        <p:spPr>
-          <a:xfrm>
-            <a:off x="457200" y="2174875"/>
-            <a:ext cx="4040100" cy="3951300"/>
-          </a:xfrm>
-          <a:prstGeom prst="rect">
-            <a:avLst/>
-          </a:prstGeom>
-          <a:noFill/>
-          <a:ln>
-            <a:noFill/>
-          </a:ln>
-        </p:spPr>
-        <p:txBody>
-          <a:bodyPr anchorCtr="0" anchor="t" bIns="45700" lIns="91425" spcFirstLastPara="1" rIns="91425" wrap="square" tIns="45700">
-            <a:noAutofit/>
-          </a:bodyPr>
-          <a:lstStyle>
-            <a:lvl1pPr indent="-381000" lvl="0" marL="457200" rtl="0" algn="l">
-              <a:spcBef>
-                <a:spcPts val="480"/>
-              </a:spcBef>
-              <a:spcAft>
-                <a:spcPts val="0"/>
-              </a:spcAft>
-              <a:buClr>
-                <a:schemeClr val="dk1"/>
-              </a:buClr>
-              <a:buSzPts val="2400"/>
-              <a:buFont typeface="Arial"/>
-              <a:buChar char="•"/>
-              <a:defRPr sz="2400"/>
-            </a:lvl1pPr>
-            <a:lvl2pPr indent="-355600" lvl="1" marL="914400" rtl="0" algn="l">
-              <a:spcBef>
-                <a:spcPts val="400"/>
-              </a:spcBef>
-              <a:spcAft>
-                <a:spcPts val="0"/>
-              </a:spcAft>
-              <a:buClr>
-                <a:schemeClr val="dk1"/>
-              </a:buClr>
-              <a:buSzPts val="2000"/>
-              <a:buFont typeface="Arial"/>
-              <a:buChar char="–"/>
-              <a:defRPr sz="2000"/>
-            </a:lvl2pPr>
-            <a:lvl3pPr indent="-342900" lvl="2" marL="1371600" rtl="0" algn="l">
-              <a:spcBef>
-                <a:spcPts val="360"/>
-              </a:spcBef>
-              <a:spcAft>
-                <a:spcPts val="0"/>
-              </a:spcAft>
-              <a:buClr>
-                <a:schemeClr val="dk1"/>
-              </a:buClr>
-              <a:buSzPts val="1800"/>
-              <a:buFont typeface="Arial"/>
-              <a:buChar char="•"/>
-              <a:defRPr sz="1800"/>
-            </a:lvl3pPr>
-            <a:lvl4pPr indent="-330200" lvl="3" marL="1828800" rtl="0" algn="l">
-              <a:spcBef>
-                <a:spcPts val="320"/>
-              </a:spcBef>
-              <a:spcAft>
-                <a:spcPts val="0"/>
-              </a:spcAft>
-              <a:buClr>
-                <a:schemeClr val="dk1"/>
-              </a:buClr>
-              <a:buSzPts val="1600"/>
-              <a:buFont typeface="Arial"/>
-              <a:buChar char="–"/>
-              <a:defRPr sz="1600"/>
-            </a:lvl4pPr>
-            <a:lvl5pPr indent="-330200" lvl="4" marL="2286000" rtl="0" algn="l">
-              <a:spcBef>
-                <a:spcPts val="320"/>
-              </a:spcBef>
-              <a:spcAft>
-                <a:spcPts val="0"/>
-              </a:spcAft>
-              <a:buClr>
-                <a:schemeClr val="dk1"/>
-              </a:buClr>
-              <a:buSzPts val="1600"/>
-              <a:buFont typeface="Arial"/>
-              <a:buChar char="»"/>
-              <a:defRPr sz="1600"/>
-            </a:lvl5pPr>
-            <a:lvl6pPr indent="-330200" lvl="5" marL="2743200" rtl="0" algn="l">
-              <a:spcBef>
-                <a:spcPts val="320"/>
-              </a:spcBef>
-              <a:spcAft>
-                <a:spcPts val="0"/>
-              </a:spcAft>
-              <a:buClr>
-                <a:schemeClr val="dk1"/>
-              </a:buClr>
-              <a:buSzPts val="1600"/>
-              <a:buFont typeface="Arial"/>
-              <a:buChar char="»"/>
-              <a:defRPr sz="1600"/>
-            </a:lvl6pPr>
-            <a:lvl7pPr indent="-330200" lvl="6" marL="3200400" rtl="0" algn="l">
-              <a:spcBef>
-                <a:spcPts val="320"/>
-              </a:spcBef>
-              <a:spcAft>
-                <a:spcPts val="0"/>
-              </a:spcAft>
-              <a:buClr>
-                <a:schemeClr val="dk1"/>
-              </a:buClr>
-              <a:buSzPts val="1600"/>
-              <a:buFont typeface="Arial"/>
-              <a:buChar char="»"/>
-              <a:defRPr sz="1600"/>
-            </a:lvl7pPr>
-            <a:lvl8pPr indent="-330200" lvl="7" marL="3657600" rtl="0" algn="l">
-              <a:spcBef>
-                <a:spcPts val="320"/>
-              </a:spcBef>
-              <a:spcAft>
-                <a:spcPts val="0"/>
-              </a:spcAft>
-              <a:buClr>
-                <a:schemeClr val="dk1"/>
-              </a:buClr>
-              <a:buSzPts val="1600"/>
-              <a:buFont typeface="Arial"/>
-              <a:buChar char="»"/>
-              <a:defRPr sz="1600"/>
-            </a:lvl8pPr>
-            <a:lvl9pPr indent="-330200" lvl="8" marL="4114800" rtl="0" algn="l">
-              <a:spcBef>
-                <a:spcPts val="320"/>
-              </a:spcBef>
-              <a:spcAft>
-                <a:spcPts val="0"/>
-              </a:spcAft>
-              <a:buClr>
-                <a:schemeClr val="dk1"/>
-              </a:buClr>
-              <a:buSzPts val="1600"/>
-              <a:buFont typeface="Arial"/>
-              <a:buChar char="»"/>
-              <a:defRPr sz="1600"/>
-            </a:lvl9pPr>
-          </a:lstStyle>
-          <a:p/>
-        </p:txBody>
-      </p:sp>
-      <p:sp>
-        <p:nvSpPr>
-          <p:cNvPr id="62" name="Google Shape;62;p13"/>
-          <p:cNvSpPr txBox="1"/>
-          <p:nvPr>
-            <p:ph idx="3" type="body"/>
-          </p:nvPr>
-        </p:nvSpPr>
-        <p:spPr>
-          <a:xfrm>
-            <a:off x="4645025" y="1535113"/>
-            <a:ext cx="4041900" cy="639900"/>
-          </a:xfrm>
-          <a:prstGeom prst="rect">
-            <a:avLst/>
-          </a:prstGeom>
-          <a:noFill/>
-          <a:ln>
-            <a:noFill/>
-          </a:ln>
-        </p:spPr>
-        <p:txBody>
-          <a:bodyPr anchorCtr="0" anchor="b" bIns="45700" lIns="91425" spcFirstLastPara="1" rIns="91425" wrap="square" tIns="45700">
-            <a:noAutofit/>
-          </a:bodyPr>
-          <a:lstStyle>
-            <a:lvl1pPr indent="-228600" lvl="0" marL="457200" rtl="0" algn="l">
-              <a:spcBef>
-                <a:spcPts val="480"/>
-              </a:spcBef>
-              <a:spcAft>
-                <a:spcPts val="0"/>
-              </a:spcAft>
-              <a:buClr>
-                <a:schemeClr val="dk1"/>
-              </a:buClr>
-              <a:buSzPts val="2400"/>
-              <a:buFont typeface="Arial"/>
-              <a:buNone/>
-              <a:defRPr b="1" sz="2400"/>
-            </a:lvl1pPr>
-            <a:lvl2pPr indent="-228600" lvl="1" marL="914400" rtl="0" algn="l">
-              <a:spcBef>
-                <a:spcPts val="400"/>
-              </a:spcBef>
-              <a:spcAft>
-                <a:spcPts val="0"/>
-              </a:spcAft>
-              <a:buClr>
-                <a:schemeClr val="dk1"/>
-              </a:buClr>
-              <a:buSzPts val="2000"/>
-              <a:buFont typeface="Arial"/>
-              <a:buNone/>
-              <a:defRPr b="1" sz="2000"/>
-            </a:lvl2pPr>
-            <a:lvl3pPr indent="-228600" lvl="2" marL="1371600" rtl="0" algn="l">
-              <a:spcBef>
-                <a:spcPts val="360"/>
-              </a:spcBef>
-              <a:spcAft>
-                <a:spcPts val="0"/>
-              </a:spcAft>
-              <a:buClr>
-                <a:schemeClr val="dk1"/>
-              </a:buClr>
-              <a:buSzPts val="1800"/>
-              <a:buFont typeface="Arial"/>
-              <a:buNone/>
-              <a:defRPr b="1" sz="1800"/>
-            </a:lvl3pPr>
-            <a:lvl4pPr indent="-228600" lvl="3" marL="1828800" rtl="0" algn="l">
-              <a:spcBef>
-                <a:spcPts val="320"/>
-              </a:spcBef>
-              <a:spcAft>
-                <a:spcPts val="0"/>
-              </a:spcAft>
-              <a:buClr>
-                <a:schemeClr val="dk1"/>
-              </a:buClr>
-              <a:buSzPts val="1600"/>
-              <a:buFont typeface="Arial"/>
-              <a:buNone/>
-              <a:defRPr b="1" sz="1600"/>
-            </a:lvl4pPr>
-            <a:lvl5pPr indent="-228600" lvl="4" marL="2286000" rtl="0" algn="l">
-              <a:spcBef>
-                <a:spcPts val="320"/>
-              </a:spcBef>
-              <a:spcAft>
-                <a:spcPts val="0"/>
-              </a:spcAft>
-              <a:buClr>
-                <a:schemeClr val="dk1"/>
-              </a:buClr>
-              <a:buSzPts val="1600"/>
-              <a:buFont typeface="Arial"/>
-              <a:buNone/>
-              <a:defRPr b="1" sz="1600"/>
-            </a:lvl5pPr>
-            <a:lvl6pPr indent="-228600" lvl="5" marL="2743200" rtl="0" algn="l">
-              <a:spcBef>
-                <a:spcPts val="320"/>
-              </a:spcBef>
-              <a:spcAft>
-                <a:spcPts val="0"/>
-              </a:spcAft>
-              <a:buClr>
-                <a:schemeClr val="dk1"/>
-              </a:buClr>
-              <a:buSzPts val="1600"/>
-              <a:buFont typeface="Arial"/>
-              <a:buNone/>
-              <a:defRPr b="1" sz="1600"/>
-            </a:lvl6pPr>
-            <a:lvl7pPr indent="-228600" lvl="6" marL="3200400" rtl="0" algn="l">
-              <a:spcBef>
-                <a:spcPts val="320"/>
-              </a:spcBef>
-              <a:spcAft>
-                <a:spcPts val="0"/>
-              </a:spcAft>
-              <a:buClr>
-                <a:schemeClr val="dk1"/>
-              </a:buClr>
-              <a:buSzPts val="1600"/>
-              <a:buFont typeface="Arial"/>
-              <a:buNone/>
-              <a:defRPr b="1" sz="1600"/>
-            </a:lvl7pPr>
-            <a:lvl8pPr indent="-228600" lvl="7" marL="3657600" rtl="0" algn="l">
-              <a:spcBef>
-                <a:spcPts val="320"/>
-              </a:spcBef>
-              <a:spcAft>
-                <a:spcPts val="0"/>
-              </a:spcAft>
-              <a:buClr>
-                <a:schemeClr val="dk1"/>
-              </a:buClr>
-              <a:buSzPts val="1600"/>
-              <a:buFont typeface="Arial"/>
-              <a:buNone/>
-              <a:defRPr b="1" sz="1600"/>
-            </a:lvl8pPr>
-            <a:lvl9pPr indent="-228600" lvl="8" marL="4114800" rtl="0" algn="l">
-              <a:spcBef>
-                <a:spcPts val="320"/>
-              </a:spcBef>
-              <a:spcAft>
-                <a:spcPts val="0"/>
-              </a:spcAft>
-              <a:buClr>
-                <a:schemeClr val="dk1"/>
-              </a:buClr>
-              <a:buSzPts val="1600"/>
-              <a:buFont typeface="Arial"/>
-              <a:buNone/>
-              <a:defRPr b="1" sz="1600"/>
-            </a:lvl9pPr>
-          </a:lstStyle>
-          <a:p/>
-        </p:txBody>
-      </p:sp>
-      <p:sp>
-        <p:nvSpPr>
-          <p:cNvPr id="63" name="Google Shape;63;p13"/>
-          <p:cNvSpPr txBox="1"/>
-          <p:nvPr>
-            <p:ph idx="4" type="body"/>
-          </p:nvPr>
-        </p:nvSpPr>
-        <p:spPr>
-          <a:xfrm>
-            <a:off x="4645025" y="2174875"/>
-            <a:ext cx="4041900" cy="3951300"/>
-          </a:xfrm>
-          <a:prstGeom prst="rect">
-            <a:avLst/>
-          </a:prstGeom>
-          <a:noFill/>
-          <a:ln>
-            <a:noFill/>
-          </a:ln>
-        </p:spPr>
-        <p:txBody>
-          <a:bodyPr anchorCtr="0" anchor="t" bIns="45700" lIns="91425" spcFirstLastPara="1" rIns="91425" wrap="square" tIns="45700">
-            <a:noAutofit/>
-          </a:bodyPr>
-          <a:lstStyle>
-            <a:lvl1pPr indent="-381000" lvl="0" marL="457200" rtl="0" algn="l">
-              <a:spcBef>
-                <a:spcPts val="480"/>
-              </a:spcBef>
-              <a:spcAft>
-                <a:spcPts val="0"/>
-              </a:spcAft>
-              <a:buClr>
-                <a:schemeClr val="dk1"/>
-              </a:buClr>
-              <a:buSzPts val="2400"/>
-              <a:buFont typeface="Arial"/>
-              <a:buChar char="•"/>
-              <a:defRPr sz="2400"/>
-            </a:lvl1pPr>
-            <a:lvl2pPr indent="-355600" lvl="1" marL="914400" rtl="0" algn="l">
-              <a:spcBef>
-                <a:spcPts val="400"/>
-              </a:spcBef>
-              <a:spcAft>
-                <a:spcPts val="0"/>
-              </a:spcAft>
-              <a:buClr>
-                <a:schemeClr val="dk1"/>
-              </a:buClr>
-              <a:buSzPts val="2000"/>
-              <a:buFont typeface="Arial"/>
-              <a:buChar char="–"/>
-              <a:defRPr sz="2000"/>
-            </a:lvl2pPr>
-            <a:lvl3pPr indent="-342900" lvl="2" marL="1371600" rtl="0" algn="l">
-              <a:spcBef>
-                <a:spcPts val="360"/>
-              </a:spcBef>
-              <a:spcAft>
-                <a:spcPts val="0"/>
-              </a:spcAft>
-              <a:buClr>
-                <a:schemeClr val="dk1"/>
-              </a:buClr>
-              <a:buSzPts val="1800"/>
-              <a:buFont typeface="Arial"/>
-              <a:buChar char="•"/>
-              <a:defRPr sz="1800"/>
-            </a:lvl3pPr>
-            <a:lvl4pPr indent="-330200" lvl="3" marL="1828800" rtl="0" algn="l">
-              <a:spcBef>
-                <a:spcPts val="320"/>
-              </a:spcBef>
-              <a:spcAft>
-                <a:spcPts val="0"/>
-              </a:spcAft>
-              <a:buClr>
-                <a:schemeClr val="dk1"/>
-              </a:buClr>
-              <a:buSzPts val="1600"/>
-              <a:buFont typeface="Arial"/>
-              <a:buChar char="–"/>
-              <a:defRPr sz="1600"/>
-            </a:lvl4pPr>
-            <a:lvl5pPr indent="-330200" lvl="4" marL="2286000" rtl="0" algn="l">
-              <a:spcBef>
-                <a:spcPts val="320"/>
-              </a:spcBef>
-              <a:spcAft>
-                <a:spcPts val="0"/>
-              </a:spcAft>
-              <a:buClr>
-                <a:schemeClr val="dk1"/>
-              </a:buClr>
-              <a:buSzPts val="1600"/>
-              <a:buFont typeface="Arial"/>
-              <a:buChar char="»"/>
-              <a:defRPr sz="1600"/>
-            </a:lvl5pPr>
-            <a:lvl6pPr indent="-330200" lvl="5" marL="2743200" rtl="0" algn="l">
-              <a:spcBef>
-                <a:spcPts val="320"/>
-              </a:spcBef>
-              <a:spcAft>
-                <a:spcPts val="0"/>
-              </a:spcAft>
-              <a:buClr>
-                <a:schemeClr val="dk1"/>
-              </a:buClr>
-              <a:buSzPts val="1600"/>
-              <a:buFont typeface="Arial"/>
-              <a:buChar char="»"/>
-              <a:defRPr sz="1600"/>
-            </a:lvl6pPr>
-            <a:lvl7pPr indent="-330200" lvl="6" marL="3200400" rtl="0" algn="l">
-              <a:spcBef>
-                <a:spcPts val="320"/>
-              </a:spcBef>
-              <a:spcAft>
-                <a:spcPts val="0"/>
-              </a:spcAft>
-              <a:buClr>
-                <a:schemeClr val="dk1"/>
-              </a:buClr>
-              <a:buSzPts val="1600"/>
-              <a:buFont typeface="Arial"/>
-              <a:buChar char="»"/>
-              <a:defRPr sz="1600"/>
-            </a:lvl7pPr>
-            <a:lvl8pPr indent="-330200" lvl="7" marL="3657600" rtl="0" algn="l">
-              <a:spcBef>
-                <a:spcPts val="320"/>
-              </a:spcBef>
-              <a:spcAft>
-                <a:spcPts val="0"/>
-              </a:spcAft>
-              <a:buClr>
-                <a:schemeClr val="dk1"/>
-              </a:buClr>
-              <a:buSzPts val="1600"/>
-              <a:buFont typeface="Arial"/>
-              <a:buChar char="»"/>
-              <a:defRPr sz="1600"/>
-            </a:lvl8pPr>
-            <a:lvl9pPr indent="-330200" lvl="8" marL="4114800" rtl="0" algn="l">
-              <a:spcBef>
-                <a:spcPts val="320"/>
-              </a:spcBef>
-              <a:spcAft>
-                <a:spcPts val="0"/>
-              </a:spcAft>
-              <a:buClr>
-                <a:schemeClr val="dk1"/>
-              </a:buClr>
-              <a:buSzPts val="1600"/>
-              <a:buFont typeface="Arial"/>
-              <a:buChar char="»"/>
-              <a:defRPr sz="1600"/>
-            </a:lvl9pPr>
-          </a:lstStyle>
-          <a:p/>
-        </p:txBody>
-      </p:sp>
-      <p:sp>
-        <p:nvSpPr>
-          <p:cNvPr id="64" name="Google Shape;64;p13"/>
-          <p:cNvSpPr txBox="1"/>
-          <p:nvPr>
-            <p:ph idx="10" type="dt"/>
-          </p:nvPr>
-        </p:nvSpPr>
-        <p:spPr>
-          <a:xfrm>
-            <a:off x="457200" y="6245225"/>
-            <a:ext cx="2133600" cy="476100"/>
-          </a:xfrm>
-          <a:prstGeom prst="rect">
-            <a:avLst/>
-          </a:prstGeom>
-          <a:noFill/>
-          <a:ln>
-            <a:noFill/>
-          </a:ln>
-        </p:spPr>
-        <p:txBody>
-          <a:bodyPr anchorCtr="0" anchor="t" bIns="45700" lIns="91425" spcFirstLastPara="1" rIns="91425" wrap="square" tIns="45700">
-            <a:noAutofit/>
-          </a:bodyPr>
-          <a:lstStyle>
-            <a:lvl1pPr lvl="0" rtl="0" algn="l">
-              <a:lnSpc>
-                <a:spcPct val="100000"/>
-              </a:lnSpc>
-              <a:spcBef>
-                <a:spcPts val="0"/>
-              </a:spcBef>
-              <a:spcAft>
-                <a:spcPts val="0"/>
-              </a:spcAft>
-              <a:buSzPts val="1400"/>
-              <a:buNone/>
-              <a:defRPr/>
-            </a:lvl1pPr>
-            <a:lvl2pPr lvl="1" rtl="0" algn="l">
-              <a:lnSpc>
-                <a:spcPct val="100000"/>
-              </a:lnSpc>
-              <a:spcBef>
-                <a:spcPts val="0"/>
-              </a:spcBef>
-              <a:spcAft>
-                <a:spcPts val="0"/>
-              </a:spcAft>
-              <a:buSzPts val="1400"/>
-              <a:buNone/>
-              <a:defRPr/>
-            </a:lvl2pPr>
-            <a:lvl3pPr lvl="2" rtl="0" algn="l">
-              <a:lnSpc>
-                <a:spcPct val="100000"/>
-              </a:lnSpc>
-              <a:spcBef>
-                <a:spcPts val="0"/>
-              </a:spcBef>
-              <a:spcAft>
-                <a:spcPts val="0"/>
-              </a:spcAft>
-              <a:buSzPts val="1400"/>
-              <a:buNone/>
-              <a:defRPr/>
-            </a:lvl3pPr>
-            <a:lvl4pPr lvl="3" rtl="0" algn="l">
-              <a:lnSpc>
-                <a:spcPct val="100000"/>
-              </a:lnSpc>
-              <a:spcBef>
-                <a:spcPts val="0"/>
-              </a:spcBef>
-              <a:spcAft>
-                <a:spcPts val="0"/>
-              </a:spcAft>
-              <a:buSzPts val="1400"/>
-              <a:buNone/>
-              <a:defRPr/>
-            </a:lvl4pPr>
-            <a:lvl5pPr lvl="4" rtl="0" algn="l">
-              <a:lnSpc>
-                <a:spcPct val="100000"/>
-              </a:lnSpc>
-              <a:spcBef>
-                <a:spcPts val="0"/>
-              </a:spcBef>
-              <a:spcAft>
-                <a:spcPts val="0"/>
-              </a:spcAft>
-              <a:buSzPts val="1400"/>
-              <a:buNone/>
-              <a:defRPr/>
-            </a:lvl5pPr>
-            <a:lvl6pPr lvl="5" rtl="0" algn="l">
-              <a:lnSpc>
-                <a:spcPct val="100000"/>
-              </a:lnSpc>
-              <a:spcBef>
-                <a:spcPts val="0"/>
-              </a:spcBef>
-              <a:spcAft>
-                <a:spcPts val="0"/>
-              </a:spcAft>
-              <a:buSzPts val="1400"/>
-              <a:buNone/>
-              <a:defRPr/>
-            </a:lvl6pPr>
-            <a:lvl7pPr lvl="6" rtl="0" algn="l">
-              <a:lnSpc>
-                <a:spcPct val="100000"/>
-              </a:lnSpc>
-              <a:spcBef>
-                <a:spcPts val="0"/>
-              </a:spcBef>
-              <a:spcAft>
-                <a:spcPts val="0"/>
-              </a:spcAft>
-              <a:buSzPts val="1400"/>
-              <a:buNone/>
-              <a:defRPr/>
-            </a:lvl7pPr>
-            <a:lvl8pPr lvl="7" rtl="0" algn="l">
-              <a:lnSpc>
-                <a:spcPct val="100000"/>
-              </a:lnSpc>
-              <a:spcBef>
-                <a:spcPts val="0"/>
-              </a:spcBef>
-              <a:spcAft>
-                <a:spcPts val="0"/>
-              </a:spcAft>
-              <a:buSzPts val="1400"/>
-              <a:buNone/>
-              <a:defRPr/>
-            </a:lvl8pPr>
-            <a:lvl9pPr lvl="8" rtl="0" algn="l">
-              <a:lnSpc>
-                <a:spcPct val="100000"/>
-              </a:lnSpc>
-              <a:spcBef>
-                <a:spcPts val="0"/>
-              </a:spcBef>
-              <a:spcAft>
-                <a:spcPts val="0"/>
-              </a:spcAft>
-              <a:buSzPts val="1400"/>
-              <a:buNone/>
-              <a:defRPr/>
-            </a:lvl9pPr>
-          </a:lstStyle>
-          <a:p/>
-        </p:txBody>
-      </p:sp>
-      <p:sp>
-        <p:nvSpPr>
-          <p:cNvPr id="65" name="Google Shape;65;p13"/>
-          <p:cNvSpPr txBox="1"/>
-          <p:nvPr>
-            <p:ph idx="11" type="ftr"/>
-          </p:nvPr>
-        </p:nvSpPr>
-        <p:spPr>
-          <a:xfrm>
-            <a:off x="3124200" y="6245225"/>
-            <a:ext cx="2895600" cy="476100"/>
-          </a:xfrm>
-          <a:prstGeom prst="rect">
-            <a:avLst/>
-          </a:prstGeom>
-          <a:noFill/>
-          <a:ln>
-            <a:noFill/>
-          </a:ln>
-        </p:spPr>
-        <p:txBody>
-          <a:bodyPr anchorCtr="0" anchor="t" bIns="45700" lIns="91425" spcFirstLastPara="1" rIns="91425" wrap="square" tIns="45700">
-            <a:noAutofit/>
-          </a:bodyPr>
-          <a:lstStyle>
-            <a:lvl1pPr lvl="0" rtl="0" algn="l">
-              <a:lnSpc>
-                <a:spcPct val="100000"/>
-              </a:lnSpc>
-              <a:spcBef>
-                <a:spcPts val="0"/>
-              </a:spcBef>
-              <a:spcAft>
-                <a:spcPts val="0"/>
-              </a:spcAft>
-              <a:buSzPts val="1400"/>
-              <a:buNone/>
-              <a:defRPr/>
-            </a:lvl1pPr>
-            <a:lvl2pPr lvl="1" rtl="0" algn="l">
-              <a:lnSpc>
-                <a:spcPct val="100000"/>
-              </a:lnSpc>
-              <a:spcBef>
-                <a:spcPts val="0"/>
-              </a:spcBef>
-              <a:spcAft>
-                <a:spcPts val="0"/>
-              </a:spcAft>
-              <a:buSzPts val="1400"/>
-              <a:buNone/>
-              <a:defRPr/>
-            </a:lvl2pPr>
-            <a:lvl3pPr lvl="2" rtl="0" algn="l">
-              <a:lnSpc>
-                <a:spcPct val="100000"/>
-              </a:lnSpc>
-              <a:spcBef>
-                <a:spcPts val="0"/>
-              </a:spcBef>
-              <a:spcAft>
-                <a:spcPts val="0"/>
-              </a:spcAft>
-              <a:buSzPts val="1400"/>
-              <a:buNone/>
-              <a:defRPr/>
-            </a:lvl3pPr>
-            <a:lvl4pPr lvl="3" rtl="0" algn="l">
-              <a:lnSpc>
-                <a:spcPct val="100000"/>
-              </a:lnSpc>
-              <a:spcBef>
-                <a:spcPts val="0"/>
-              </a:spcBef>
-              <a:spcAft>
-                <a:spcPts val="0"/>
-              </a:spcAft>
-              <a:buSzPts val="1400"/>
-              <a:buNone/>
-              <a:defRPr/>
-            </a:lvl4pPr>
-            <a:lvl5pPr lvl="4" rtl="0" algn="l">
-              <a:lnSpc>
-                <a:spcPct val="100000"/>
-              </a:lnSpc>
-              <a:spcBef>
-                <a:spcPts val="0"/>
-              </a:spcBef>
-              <a:spcAft>
-                <a:spcPts val="0"/>
-              </a:spcAft>
-              <a:buSzPts val="1400"/>
-              <a:buNone/>
-              <a:defRPr/>
-            </a:lvl5pPr>
-            <a:lvl6pPr lvl="5" rtl="0" algn="l">
-              <a:lnSpc>
-                <a:spcPct val="100000"/>
-              </a:lnSpc>
-              <a:spcBef>
-                <a:spcPts val="0"/>
-              </a:spcBef>
-              <a:spcAft>
-                <a:spcPts val="0"/>
-              </a:spcAft>
-              <a:buSzPts val="1400"/>
-              <a:buNone/>
-              <a:defRPr/>
-            </a:lvl6pPr>
-            <a:lvl7pPr lvl="6" rtl="0" algn="l">
-              <a:lnSpc>
-                <a:spcPct val="100000"/>
-              </a:lnSpc>
-              <a:spcBef>
-                <a:spcPts val="0"/>
-              </a:spcBef>
-              <a:spcAft>
-                <a:spcPts val="0"/>
-              </a:spcAft>
-              <a:buSzPts val="1400"/>
-              <a:buNone/>
-              <a:defRPr/>
-            </a:lvl7pPr>
-            <a:lvl8pPr lvl="7" rtl="0" algn="l">
-              <a:lnSpc>
-                <a:spcPct val="100000"/>
-              </a:lnSpc>
-              <a:spcBef>
-                <a:spcPts val="0"/>
-              </a:spcBef>
-              <a:spcAft>
-                <a:spcPts val="0"/>
-              </a:spcAft>
-              <a:buSzPts val="1400"/>
-              <a:buNone/>
-              <a:defRPr/>
-            </a:lvl8pPr>
-            <a:lvl9pPr lvl="8" rtl="0" algn="l">
-              <a:lnSpc>
-                <a:spcPct val="100000"/>
-              </a:lnSpc>
-              <a:spcBef>
-                <a:spcPts val="0"/>
-              </a:spcBef>
-              <a:spcAft>
-                <a:spcPts val="0"/>
-              </a:spcAft>
-              <a:buSzPts val="1400"/>
-              <a:buNone/>
-              <a:defRPr/>
-            </a:lvl9pPr>
-          </a:lstStyle>
-          <a:p/>
-        </p:txBody>
-      </p:sp>
-      <p:sp>
-        <p:nvSpPr>
-          <p:cNvPr id="66" name="Google Shape;66;p13"/>
+          <p:cNvPr id="63" name="Google Shape;63;p12"/>
           <p:cNvSpPr txBox="1"/>
           <p:nvPr>
             <p:ph idx="12" type="sldNum"/>
@@ -12669,6 +13625,7 @@
     <p:sldLayoutId id="2147483657" r:id="rId10"/>
     <p:sldLayoutId id="2147483658" r:id="rId11"/>
     <p:sldLayoutId id="2147483659" r:id="rId12"/>
+    <p:sldLayoutId id="2147483660" r:id="rId13"/>
   </p:sldLayoutIdLst>
   <p:hf dt="0" ftr="0" hdr="0" sldNum="0"/>
   <p:txStyles>
@@ -13380,7 +14337,7 @@
     </p:bg>
     <p:spTree>
       <p:nvGrpSpPr>
-        <p:cNvPr id="83" name="Shape 83"/>
+        <p:cNvPr id="89" name="Shape 89"/>
         <p:cNvGrpSpPr/>
         <p:nvPr/>
       </p:nvGrpSpPr>
@@ -13394,7 +14351,7 @@
       </p:grpSpPr>
       <p:sp>
         <p:nvSpPr>
-          <p:cNvPr id="84" name="Google Shape;84;p1"/>
+          <p:cNvPr id="90" name="Google Shape;90;p1"/>
           <p:cNvSpPr txBox="1"/>
           <p:nvPr/>
         </p:nvSpPr>
@@ -13613,17 +14570,24 @@
         <p:txBody>
           <a:bodyPr/>
           <a:lstStyle/>
+          <a:p/>
           <a:p>
             <a:r>
               <a:t>In python a string is most easily identified by the use of double quotes</a:t>
             </a:r>
           </a:p>
           <a:p>
+            <a:pPr lvl="1">
+              <a:defRPr sz="1600"/>
+            </a:pPr>
             <a:r>
               <a:t>bar</a:t>
             </a:r>
           </a:p>
           <a:p>
+            <a:pPr lvl="1">
+              <a:defRPr sz="1600"/>
+            </a:pPr>
             <a:r>
               <a:t>foo</a:t>
             </a:r>
@@ -13707,17 +14671,24 @@
         <p:txBody>
           <a:bodyPr/>
           <a:lstStyle/>
+          <a:p/>
           <a:p>
             <a:r>
               <a:t>In python a string is most easily identified by the use of double quotes</a:t>
             </a:r>
           </a:p>
           <a:p>
+            <a:pPr lvl="1">
+              <a:defRPr sz="1600"/>
+            </a:pPr>
             <a:r>
               <a:t>bar</a:t>
             </a:r>
           </a:p>
           <a:p>
+            <a:pPr lvl="1">
+              <a:defRPr sz="1600"/>
+            </a:pPr>
             <a:r>
               <a:t>foo</a:t>
             </a:r>
@@ -13802,17 +14773,27 @@
           <a:bodyPr/>
           <a:lstStyle/>
           <a:p/>
+          <a:p/>
           <a:p>
+            <a:pPr lvl="1">
+              <a:defRPr sz="1600"/>
+            </a:pPr>
             <a:r>
               <a:t>Can be thought of as simply a program that you feed commands to</a:t>
             </a:r>
           </a:p>
           <a:p>
+            <a:pPr lvl="1">
+              <a:defRPr sz="1600"/>
+            </a:pPr>
             <a:r>
               <a:t>You can write scripts or programs that make the computer do whatever you can dream up</a:t>
             </a:r>
           </a:p>
           <a:p>
+            <a:pPr lvl="1">
+              <a:defRPr sz="1600"/>
+            </a:pPr>
             <a:r>
               <a:t>There are many programming languages at least 700 or so according to Wikipedia</a:t>
             </a:r>
@@ -13899,70 +14880,122 @@
           <a:p/>
           <a:p>
             <a:r>
+              <a:t>Aaron's list of most popular languages</a:t>
+            </a:r>
+          </a:p>
+          <a:p>
+            <a:r>
+              <a:t>foobar</a:t>
+            </a:r>
+          </a:p>
+          <a:p>
+            <a:pPr lvl="1">
+              <a:defRPr sz="1600"/>
+            </a:pPr>
+            <a:r>
               <a:t>1957 - FORTRAN - Compiled</a:t>
             </a:r>
           </a:p>
           <a:p>
+            <a:pPr lvl="1">
+              <a:defRPr sz="1600"/>
+            </a:pPr>
             <a:r>
               <a:t>1964 - BASIC - Interpreted</a:t>
             </a:r>
           </a:p>
           <a:p>
+            <a:pPr lvl="1">
+              <a:defRPr sz="1600"/>
+            </a:pPr>
             <a:r>
               <a:t>1970 - Pascal - Compiled</a:t>
             </a:r>
           </a:p>
           <a:p>
+            <a:pPr lvl="1">
+              <a:defRPr sz="1600"/>
+            </a:pPr>
             <a:r>
               <a:t>1972 - C - Compiled</a:t>
             </a:r>
           </a:p>
           <a:p>
+            <a:pPr lvl="1">
+              <a:defRPr sz="1600"/>
+            </a:pPr>
             <a:r>
               <a:t>1980 - C++ - Compiled</a:t>
             </a:r>
           </a:p>
           <a:p>
+            <a:pPr lvl="1">
+              <a:defRPr sz="1600"/>
+            </a:pPr>
             <a:r>
               <a:t>1991 - Python - Interpreted</a:t>
             </a:r>
           </a:p>
           <a:p>
+            <a:pPr lvl="1">
+              <a:defRPr sz="1600"/>
+            </a:pPr>
             <a:r>
               <a:t>1991 - Visual Basic - Compiled</a:t>
             </a:r>
           </a:p>
           <a:p>
+            <a:pPr lvl="1">
+              <a:defRPr sz="1600"/>
+            </a:pPr>
             <a:r>
               <a:t>1995 - Ruby - Interpreted</a:t>
             </a:r>
           </a:p>
           <a:p>
+            <a:pPr lvl="1">
+              <a:defRPr sz="1600"/>
+            </a:pPr>
             <a:r>
               <a:t>1995 - Java - Compiled (JVM)</a:t>
             </a:r>
           </a:p>
           <a:p>
+            <a:pPr lvl="1">
+              <a:defRPr sz="1600"/>
+            </a:pPr>
             <a:r>
               <a:t>1995 - JavaScript - Interpreted</a:t>
             </a:r>
           </a:p>
           <a:p>
+            <a:pPr lvl="1">
+              <a:defRPr sz="1600"/>
+            </a:pPr>
             <a:r>
               <a:t>1995 - PHP - Interpreted</a:t>
             </a:r>
           </a:p>
           <a:p>
+            <a:pPr lvl="1">
+              <a:defRPr sz="1600"/>
+            </a:pPr>
             <a:r>
               <a:t>2001 - C# - Compiled (CLR)</a:t>
             </a:r>
           </a:p>
           <a:p>
+            <a:pPr lvl="1">
+              <a:defRPr sz="1600"/>
+            </a:pPr>
             <a:r>
               <a:t>2009 - Go - Compiled (Google - produces statically linked native binaries without external dependencies.)</a:t>
             </a:r>
           </a:p>
           <a:p>
+            <a:pPr lvl="1">
+              <a:defRPr sz="1600"/>
+            </a:pPr>
             <a:r>
               <a:t>2011 - Dart Compiled/Interpreted (Google - AOT-compiled to JavaScript)</a:t>
             </a:r>
@@ -14047,12 +15080,19 @@
           <a:bodyPr/>
           <a:lstStyle/>
           <a:p/>
+          <a:p/>
           <a:p>
+            <a:pPr lvl="1">
+              <a:defRPr sz="1600"/>
+            </a:pPr>
             <a:r>
               <a:t>Compiled languages - converted directly into machine code that the processor can execute. As a result, they tend to be faster and more efficient to execute than interpreted languages.</a:t>
             </a:r>
           </a:p>
           <a:p>
+            <a:pPr lvl="1">
+              <a:defRPr sz="1600"/>
+            </a:pPr>
             <a:r>
               <a:t>Interpreted languages - the source code is not directly translated by the target machine. Instead, a different program, aka the interpreter, reads and executes the code.</a:t>
             </a:r>
@@ -14137,32 +15177,51 @@
           <a:bodyPr/>
           <a:lstStyle/>
           <a:p/>
+          <a:p/>
           <a:p>
+            <a:pPr lvl="1">
+              <a:defRPr sz="1600"/>
+            </a:pPr>
             <a:r>
               <a:t>Scripts are usually interpreted (but not always, such as with golang scripts)</a:t>
             </a:r>
           </a:p>
           <a:p>
+            <a:pPr lvl="1">
+              <a:defRPr sz="1600"/>
+            </a:pPr>
             <a:r>
               <a:t>Programs can be either compiled (C++, C#, Java) or interpreted (Python, Ruby, PHP)</a:t>
             </a:r>
           </a:p>
           <a:p>
+            <a:pPr lvl="1">
+              <a:defRPr sz="1600"/>
+            </a:pPr>
             <a:r>
               <a:t>The biggest difference is that scripts are written to control an existing program</a:t>
             </a:r>
           </a:p>
           <a:p>
+            <a:pPr lvl="1">
+              <a:defRPr sz="1600"/>
+            </a:pPr>
             <a:r>
               <a:t>Scripts often automate manual tasks to make work easier to accomplish</a:t>
             </a:r>
           </a:p>
           <a:p>
+            <a:pPr lvl="1">
+              <a:defRPr sz="1600"/>
+            </a:pPr>
             <a:r>
               <a:t>Scripts can accomplish many important tasks and are often written by a single person</a:t>
             </a:r>
           </a:p>
           <a:p>
+            <a:pPr lvl="1">
+              <a:defRPr sz="1600"/>
+            </a:pPr>
             <a:r>
               <a:t>Programs usually have very ambitious goals and often take a large amount of time and money to create</a:t>
             </a:r>
@@ -14246,17 +15305,24 @@
         <p:txBody>
           <a:bodyPr/>
           <a:lstStyle/>
+          <a:p/>
           <a:p>
             <a:r>
               <a:t>In python a string is most easily identified by the use of double quotes</a:t>
             </a:r>
           </a:p>
           <a:p>
+            <a:pPr lvl="1">
+              <a:defRPr sz="1600"/>
+            </a:pPr>
             <a:r>
               <a:t>bar</a:t>
             </a:r>
           </a:p>
           <a:p>
+            <a:pPr lvl="1">
+              <a:defRPr sz="1600"/>
+            </a:pPr>
             <a:r>
               <a:t>foo</a:t>
             </a:r>
@@ -14340,17 +15406,24 @@
         <p:txBody>
           <a:bodyPr/>
           <a:lstStyle/>
+          <a:p/>
           <a:p>
             <a:r>
               <a:t>In python a string is most easily identified by the use of double quotes</a:t>
             </a:r>
           </a:p>
           <a:p>
+            <a:pPr lvl="1">
+              <a:defRPr sz="1600"/>
+            </a:pPr>
             <a:r>
               <a:t>bar</a:t>
             </a:r>
           </a:p>
           <a:p>
+            <a:pPr lvl="1">
+              <a:defRPr sz="1600"/>
+            </a:pPr>
             <a:r>
               <a:t>foo</a:t>
             </a:r>
@@ -14434,17 +15507,24 @@
         <p:txBody>
           <a:bodyPr/>
           <a:lstStyle/>
+          <a:p/>
           <a:p>
             <a:r>
               <a:t>In python a string is most easily identified by the use of double quotes</a:t>
             </a:r>
           </a:p>
           <a:p>
+            <a:pPr lvl="1">
+              <a:defRPr sz="1600"/>
+            </a:pPr>
             <a:r>
               <a:t>bar</a:t>
             </a:r>
           </a:p>
           <a:p>
+            <a:pPr lvl="1">
+              <a:defRPr sz="1600"/>
+            </a:pPr>
             <a:r>
               <a:t>foo</a:t>
             </a:r>
@@ -14528,17 +15608,24 @@
         <p:txBody>
           <a:bodyPr/>
           <a:lstStyle/>
+          <a:p/>
           <a:p>
             <a:r>
               <a:t>In python a string is most easily identified by the use of double quotes</a:t>
             </a:r>
           </a:p>
           <a:p>
+            <a:pPr lvl="1">
+              <a:defRPr sz="1600"/>
+            </a:pPr>
             <a:r>
               <a:t>bar</a:t>
             </a:r>
           </a:p>
           <a:p>
+            <a:pPr lvl="1">
+              <a:defRPr sz="1600"/>
+            </a:pPr>
             <a:r>
               <a:t>foo</a:t>
             </a:r>

</xml_diff>